<commit_message>
finished small FC presentation
</commit_message>
<xml_diff>
--- a/2020/FC_sept_Graphs_LS/FeatureCloud_PPT_WP4_update.pptx
+++ b/2020/FC_sept_Graphs_LS/FeatureCloud_PPT_WP4_update.pptx
@@ -5,27 +5,22 @@
     <p:sldMasterId id="2147483712" r:id="rId1"/>
   </p:sldMasterIdLst>
   <p:notesMasterIdLst>
-    <p:notesMasterId r:id="rId17"/>
+    <p:notesMasterId r:id="rId12"/>
   </p:notesMasterIdLst>
   <p:handoutMasterIdLst>
-    <p:handoutMasterId r:id="rId18"/>
+    <p:handoutMasterId r:id="rId13"/>
   </p:handoutMasterIdLst>
   <p:sldIdLst>
     <p:sldId id="283" r:id="rId2"/>
     <p:sldId id="289" r:id="rId3"/>
     <p:sldId id="297" r:id="rId4"/>
-    <p:sldId id="298" r:id="rId5"/>
-    <p:sldId id="291" r:id="rId6"/>
-    <p:sldId id="299" r:id="rId7"/>
-    <p:sldId id="292" r:id="rId8"/>
-    <p:sldId id="300" r:id="rId9"/>
-    <p:sldId id="293" r:id="rId10"/>
-    <p:sldId id="294" r:id="rId11"/>
-    <p:sldId id="296" r:id="rId12"/>
-    <p:sldId id="290" r:id="rId13"/>
-    <p:sldId id="286" r:id="rId14"/>
-    <p:sldId id="295" r:id="rId15"/>
-    <p:sldId id="287" r:id="rId16"/>
+    <p:sldId id="291" r:id="rId5"/>
+    <p:sldId id="298" r:id="rId6"/>
+    <p:sldId id="292" r:id="rId7"/>
+    <p:sldId id="300" r:id="rId8"/>
+    <p:sldId id="293" r:id="rId9"/>
+    <p:sldId id="294" r:id="rId10"/>
+    <p:sldId id="299" r:id="rId11"/>
   </p:sldIdLst>
   <p:sldSz cx="9144000" cy="6858000" type="screen4x3"/>
   <p:notesSz cx="6858000" cy="9144000"/>
@@ -2376,7 +2371,7 @@
               </a14:hiddenLine>
             </a:ext>
             <a:ext uri="{FAA26D3D-D897-4be2-8F04-BA451C77F1D7}">
-              <ma14:placeholderFlag xmlns:ma14="http://schemas.microsoft.com/office/mac/drawingml/2011/main" xmlns="" val="1"/>
+              <ma14:placeholderFlag xmlns="" xmlns:ma14="http://schemas.microsoft.com/office/mac/drawingml/2011/main" val="1"/>
             </a:ext>
           </a:extLst>
         </p:spPr>
@@ -2438,7 +2433,7 @@
               </a14:hiddenLine>
             </a:ext>
             <a:ext uri="{FAA26D3D-D897-4be2-8F04-BA451C77F1D7}">
-              <ma14:placeholderFlag xmlns:ma14="http://schemas.microsoft.com/office/mac/drawingml/2011/main" xmlns="" val="1"/>
+              <ma14:placeholderFlag xmlns="" xmlns:ma14="http://schemas.microsoft.com/office/mac/drawingml/2011/main" val="1"/>
             </a:ext>
           </a:extLst>
         </p:spPr>
@@ -3393,7 +3388,7 @@
               </a14:hiddenLine>
             </a:ext>
             <a:ext uri="{FAA26D3D-D897-4be2-8F04-BA451C77F1D7}">
-              <ma14:placeholderFlag xmlns:ma14="http://schemas.microsoft.com/office/mac/drawingml/2011/main" xmlns="" val="1"/>
+              <ma14:placeholderFlag xmlns="" xmlns:ma14="http://schemas.microsoft.com/office/mac/drawingml/2011/main" val="1"/>
             </a:ext>
           </a:extLst>
         </p:spPr>
@@ -3595,7 +3590,41 @@
       </p:grpSpPr>
       <p:sp>
         <p:nvSpPr>
-          <p:cNvPr id="4" name="Fußzeilenplatzhalter 3"/>
+          <p:cNvPr id="2" name="Title 1">
+            <a:extLst>
+              <a:ext uri="{FF2B5EF4-FFF2-40B4-BE49-F238E27FC236}">
+                <a16:creationId xmlns:a16="http://schemas.microsoft.com/office/drawing/2014/main" id="{C1FDB87A-3338-40AF-B490-6445F74B78FC}"/>
+              </a:ext>
+            </a:extLst>
+          </p:cNvPr>
+          <p:cNvSpPr>
+            <a:spLocks noGrp="1"/>
+          </p:cNvSpPr>
+          <p:nvPr>
+            <p:ph type="title"/>
+          </p:nvPr>
+        </p:nvSpPr>
+        <p:spPr/>
+        <p:txBody>
+          <a:bodyPr/>
+          <a:lstStyle/>
+          <a:p>
+            <a:r>
+              <a:rPr lang="en-US" dirty="0"/>
+              <a:t>Federated learning – overview &amp; issues</a:t>
+            </a:r>
+          </a:p>
+        </p:txBody>
+      </p:sp>
+      <p:sp>
+        <p:nvSpPr>
+          <p:cNvPr id="4" name="Footer Placeholder 3">
+            <a:extLst>
+              <a:ext uri="{FF2B5EF4-FFF2-40B4-BE49-F238E27FC236}">
+                <a16:creationId xmlns:a16="http://schemas.microsoft.com/office/drawing/2014/main" id="{C3694155-B703-491F-B4DE-366560C066CF}"/>
+              </a:ext>
+            </a:extLst>
+          </p:cNvPr>
           <p:cNvSpPr>
             <a:spLocks noGrp="1"/>
           </p:cNvSpPr>
@@ -3612,1501 +3641,110 @@
               <a:defRPr/>
             </a:pPr>
             <a:r>
-              <a:rPr lang="en-GB" dirty="0"/>
-              <a:t>This project has received funding from the European Union’s Horizon 2020 research and innovation programme under grant agreement No 826078</a:t>
-            </a:r>
+              <a:rPr lang="de-DE"/>
+              <a:t>This project hast received funding from the European Union’s Horizon 2020 research and innovation programme under grant agreement No </a:t>
+            </a:r>
+            <a:r>
+              <a:rPr lang="is-IS"/>
+              <a:t>826078</a:t>
+            </a:r>
+            <a:endParaRPr lang="de-DE" dirty="0"/>
           </a:p>
         </p:txBody>
       </p:sp>
+      <p:pic>
+        <p:nvPicPr>
+          <p:cNvPr id="5" name="Content Placeholder 5" descr="A close up of a map&#10;&#10;Description automatically generated">
+            <a:extLst>
+              <a:ext uri="{FF2B5EF4-FFF2-40B4-BE49-F238E27FC236}">
+                <a16:creationId xmlns:a16="http://schemas.microsoft.com/office/drawing/2014/main" id="{013E739F-9F30-4F05-8BF4-A1B20223C535}"/>
+              </a:ext>
+            </a:extLst>
+          </p:cNvPr>
+          <p:cNvPicPr>
+            <a:picLocks noGrp="1" noChangeAspect="1"/>
+          </p:cNvPicPr>
+          <p:nvPr>
+            <p:ph sz="quarter" idx="1"/>
+          </p:nvPr>
+        </p:nvPicPr>
+        <p:blipFill>
+          <a:blip r:embed="rId2"/>
+          <a:stretch>
+            <a:fillRect/>
+          </a:stretch>
+        </p:blipFill>
+        <p:spPr>
+          <a:xfrm>
+            <a:off x="481426" y="1564406"/>
+            <a:ext cx="3844032" cy="1638725"/>
+          </a:xfrm>
+        </p:spPr>
+      </p:pic>
       <p:sp>
         <p:nvSpPr>
-          <p:cNvPr id="7" name="Text Box 4"/>
-          <p:cNvSpPr txBox="1">
-            <a:spLocks noChangeArrowheads="1"/>
-          </p:cNvSpPr>
+          <p:cNvPr id="6" name="TextBox 5">
+            <a:extLst>
+              <a:ext uri="{FF2B5EF4-FFF2-40B4-BE49-F238E27FC236}">
+                <a16:creationId xmlns:a16="http://schemas.microsoft.com/office/drawing/2014/main" id="{FD300EB5-CFC7-4E4C-8111-085178D5318B}"/>
+              </a:ext>
+            </a:extLst>
+          </p:cNvPr>
+          <p:cNvSpPr txBox="1"/>
           <p:nvPr/>
         </p:nvSpPr>
-        <p:spPr bwMode="auto">
-          <a:xfrm rot="956087">
-            <a:off x="2468148" y="2548992"/>
-            <a:ext cx="4032250" cy="923330"/>
+        <p:spPr>
+          <a:xfrm>
+            <a:off x="416642" y="3187326"/>
+            <a:ext cx="3908816" cy="553998"/>
           </a:xfrm>
           <a:prstGeom prst="rect">
             <a:avLst/>
           </a:prstGeom>
-          <a:solidFill>
-            <a:srgbClr val="C8D200"/>
-          </a:solidFill>
-          <a:ln w="28575">
-            <a:solidFill>
-              <a:srgbClr val="153A8C"/>
-            </a:solidFill>
-            <a:miter lim="800000"/>
-            <a:headEnd/>
-            <a:tailEnd/>
-          </a:ln>
+          <a:noFill/>
         </p:spPr>
         <p:txBody>
-          <a:bodyPr>
+          <a:bodyPr wrap="square">
             <a:spAutoFit/>
           </a:bodyPr>
           <a:lstStyle/>
           <a:p>
-            <a:pPr algn="ctr"/>
-            <a:r>
-              <a:rPr lang="en-US" sz="1800" b="1" dirty="0"/>
-              <a:t>Please mind the time for your presentation - see agenda. </a:t>
-            </a:r>
-          </a:p>
-          <a:p>
-            <a:pPr algn="ctr"/>
-            <a:r>
-              <a:rPr lang="en-US" sz="1800" b="1" dirty="0"/>
-              <a:t>Thank you.</a:t>
-            </a:r>
+            <a:r>
+              <a:rPr lang="en-GB" sz="1000" dirty="0"/>
+              <a:t>Tian Li, </a:t>
+            </a:r>
+            <a:r>
+              <a:rPr lang="en-GB" sz="1000" dirty="0" err="1"/>
+              <a:t>Anit</a:t>
+            </a:r>
+            <a:r>
+              <a:rPr lang="en-GB" sz="1000" dirty="0"/>
+              <a:t> Kumar </a:t>
+            </a:r>
+            <a:r>
+              <a:rPr lang="en-GB" sz="1000" dirty="0" err="1"/>
+              <a:t>Sahu</a:t>
+            </a:r>
+            <a:r>
+              <a:rPr lang="en-GB" sz="1000" dirty="0"/>
+              <a:t>, </a:t>
+            </a:r>
+            <a:r>
+              <a:rPr lang="en-GB" sz="1000" dirty="0" err="1"/>
+              <a:t>Ameet</a:t>
+            </a:r>
+            <a:r>
+              <a:rPr lang="en-GB" sz="1000" dirty="0"/>
+              <a:t> Talwalkar, and Virginia Smith. Federated Learning: Challenges, Methods, and Future Directions. pages 1–21, 2019. URL http://arxiv.org/abs/1908.07873. </a:t>
+            </a:r>
+            <a:endParaRPr lang="en-US" sz="1000" dirty="0"/>
           </a:p>
         </p:txBody>
       </p:sp>
     </p:spTree>
     <p:extLst>
       <p:ext uri="{BB962C8B-B14F-4D97-AF65-F5344CB8AC3E}">
-        <p14:creationId xmlns:p14="http://schemas.microsoft.com/office/powerpoint/2010/main" val="3062425111"/>
-      </p:ext>
-    </p:extLst>
-  </p:cSld>
-  <p:clrMapOvr>
-    <a:masterClrMapping/>
-  </p:clrMapOvr>
-</p:sld>
-</file>
-
-<file path=ppt/slides/slide11.xml><?xml version="1.0" encoding="utf-8"?>
-<p:sld xmlns:a="http://schemas.openxmlformats.org/drawingml/2006/main" xmlns:r="http://schemas.openxmlformats.org/officeDocument/2006/relationships" xmlns:p="http://schemas.openxmlformats.org/presentationml/2006/main">
-  <p:cSld>
-    <p:spTree>
-      <p:nvGrpSpPr>
-        <p:cNvPr id="1" name=""/>
-        <p:cNvGrpSpPr/>
-        <p:nvPr/>
-      </p:nvGrpSpPr>
-      <p:grpSpPr>
-        <a:xfrm>
-          <a:off x="0" y="0"/>
-          <a:ext cx="0" cy="0"/>
-          <a:chOff x="0" y="0"/>
-          <a:chExt cx="0" cy="0"/>
-        </a:xfrm>
-      </p:grpSpPr>
-      <p:sp>
-        <p:nvSpPr>
-          <p:cNvPr id="2" name="Fußzeilenplatzhalter 1"/>
-          <p:cNvSpPr>
-            <a:spLocks noGrp="1"/>
-          </p:cNvSpPr>
-          <p:nvPr>
-            <p:ph type="ftr" sz="quarter" idx="3"/>
-          </p:nvPr>
-        </p:nvSpPr>
-        <p:spPr/>
-        <p:txBody>
-          <a:bodyPr/>
-          <a:lstStyle/>
-          <a:p>
-            <a:pPr>
-              <a:defRPr/>
-            </a:pPr>
-            <a:r>
-              <a:rPr lang="en-GB" dirty="0"/>
-              <a:t>This project has received funding from the European Union’s Horizon 2020 research and innovation programme under grant agreement No 826078</a:t>
-            </a:r>
-          </a:p>
-        </p:txBody>
-      </p:sp>
-      <p:sp>
-        <p:nvSpPr>
-          <p:cNvPr id="3" name="Inhaltsplatzhalter 2"/>
-          <p:cNvSpPr txBox="1">
-            <a:spLocks/>
-          </p:cNvSpPr>
-          <p:nvPr/>
-        </p:nvSpPr>
-        <p:spPr>
-          <a:xfrm>
-            <a:off x="481426" y="2182940"/>
-            <a:ext cx="8101255" cy="4140000"/>
-          </a:xfrm>
-          <a:prstGeom prst="rect">
-            <a:avLst/>
-          </a:prstGeom>
-        </p:spPr>
-        <p:txBody>
-          <a:bodyPr/>
-          <a:lstStyle>
-            <a:lvl1pPr marL="179388" indent="-179388" algn="l" rtl="0" eaLnBrk="1" fontAlgn="base" hangingPunct="1">
-              <a:lnSpc>
-                <a:spcPts val="2200"/>
-              </a:lnSpc>
-              <a:spcBef>
-                <a:spcPts val="0"/>
-              </a:spcBef>
-              <a:spcAft>
-                <a:spcPts val="1000"/>
-              </a:spcAft>
-              <a:buClr>
-                <a:schemeClr val="accent4"/>
-              </a:buClr>
-              <a:buSzPct val="120000"/>
-              <a:buFont typeface="Arial" charset="0"/>
-              <a:buChar char="•"/>
-              <a:defRPr sz="1800" kern="1200">
-                <a:solidFill>
-                  <a:schemeClr val="accent3"/>
-                </a:solidFill>
-                <a:latin typeface="Arial"/>
-                <a:ea typeface="ＭＳ Ｐゴシック" charset="-128"/>
-                <a:cs typeface="Arial"/>
-              </a:defRPr>
-            </a:lvl1pPr>
-            <a:lvl2pPr marL="536400" indent="-285750" algn="l" rtl="0" eaLnBrk="1" fontAlgn="base" hangingPunct="1">
-              <a:lnSpc>
-                <a:spcPct val="100000"/>
-              </a:lnSpc>
-              <a:spcBef>
-                <a:spcPts val="0"/>
-              </a:spcBef>
-              <a:spcAft>
-                <a:spcPts val="1000"/>
-              </a:spcAft>
-              <a:buClr>
-                <a:schemeClr val="accent4"/>
-              </a:buClr>
-              <a:buSzPct val="120000"/>
-              <a:buFont typeface="Lucida Grande"/>
-              <a:buChar char="–"/>
-              <a:defRPr kern="1200">
-                <a:solidFill>
-                  <a:schemeClr val="accent3"/>
-                </a:solidFill>
-                <a:latin typeface="Arial"/>
-                <a:ea typeface="ＭＳ Ｐゴシック" charset="-128"/>
-                <a:cs typeface="Arial"/>
-              </a:defRPr>
-            </a:lvl2pPr>
-            <a:lvl3pPr marL="684000" indent="-179388" algn="l" rtl="0" eaLnBrk="1" fontAlgn="base" hangingPunct="1">
-              <a:lnSpc>
-                <a:spcPct val="100000"/>
-              </a:lnSpc>
-              <a:spcBef>
-                <a:spcPts val="0"/>
-              </a:spcBef>
-              <a:spcAft>
-                <a:spcPts val="1000"/>
-              </a:spcAft>
-              <a:buClr>
-                <a:schemeClr val="accent4"/>
-              </a:buClr>
-              <a:buSzPct val="120000"/>
-              <a:buFont typeface="Arial" charset="0"/>
-              <a:buChar char="•"/>
-              <a:defRPr sz="1600" kern="1200">
-                <a:solidFill>
-                  <a:schemeClr val="accent3"/>
-                </a:solidFill>
-                <a:latin typeface="Arial"/>
-                <a:ea typeface="ＭＳ Ｐゴシック" charset="-128"/>
-                <a:cs typeface="Arial"/>
-              </a:defRPr>
-            </a:lvl3pPr>
-            <a:lvl4pPr marL="864000" indent="-179388" algn="l" rtl="0" eaLnBrk="1" fontAlgn="base" hangingPunct="1">
-              <a:lnSpc>
-                <a:spcPct val="100000"/>
-              </a:lnSpc>
-              <a:spcBef>
-                <a:spcPts val="0"/>
-              </a:spcBef>
-              <a:spcAft>
-                <a:spcPts val="1000"/>
-              </a:spcAft>
-              <a:buClr>
-                <a:schemeClr val="accent4"/>
-              </a:buClr>
-              <a:buSzPct val="120000"/>
-              <a:buFont typeface="Lucida Grande"/>
-              <a:buChar char="–"/>
-              <a:defRPr sz="1400" kern="1200">
-                <a:solidFill>
-                  <a:schemeClr val="accent3"/>
-                </a:solidFill>
-                <a:latin typeface="Arial"/>
-                <a:ea typeface="ＭＳ Ｐゴシック" charset="-128"/>
-                <a:cs typeface="Arial"/>
-              </a:defRPr>
-            </a:lvl4pPr>
-            <a:lvl5pPr marL="1044000" indent="-179388" algn="l" rtl="0" eaLnBrk="1" fontAlgn="base" hangingPunct="1">
-              <a:lnSpc>
-                <a:spcPct val="100000"/>
-              </a:lnSpc>
-              <a:spcBef>
-                <a:spcPts val="0"/>
-              </a:spcBef>
-              <a:spcAft>
-                <a:spcPts val="1000"/>
-              </a:spcAft>
-              <a:buClr>
-                <a:schemeClr val="accent4"/>
-              </a:buClr>
-              <a:buSzPct val="120000"/>
-              <a:buFont typeface="Arial" charset="0"/>
-              <a:buChar char="•"/>
-              <a:defRPr sz="1400" kern="1200">
-                <a:solidFill>
-                  <a:schemeClr val="accent3"/>
-                </a:solidFill>
-                <a:latin typeface="Arial"/>
-                <a:ea typeface="ＭＳ Ｐゴシック" charset="-128"/>
-                <a:cs typeface="Arial"/>
-              </a:defRPr>
-            </a:lvl5pPr>
-            <a:lvl6pPr marL="2103120" indent="-228600" algn="l" rtl="0" eaLnBrk="1" latinLnBrk="0" hangingPunct="1">
-              <a:spcBef>
-                <a:spcPct val="20000"/>
-              </a:spcBef>
-              <a:buClr>
-                <a:schemeClr val="accent1"/>
-              </a:buClr>
-              <a:buFont typeface="Wingdings"/>
-              <a:buChar char="§"/>
-              <a:defRPr kumimoji="0" sz="1800" kern="1200" baseline="0">
-                <a:solidFill>
-                  <a:schemeClr val="tx1"/>
-                </a:solidFill>
-                <a:latin typeface="+mn-lt"/>
-                <a:ea typeface="+mn-ea"/>
-                <a:cs typeface="+mn-cs"/>
-              </a:defRPr>
-            </a:lvl6pPr>
-            <a:lvl7pPr marL="2377440" indent="-228600" algn="l" rtl="0" eaLnBrk="1" latinLnBrk="0" hangingPunct="1">
-              <a:spcBef>
-                <a:spcPct val="20000"/>
-              </a:spcBef>
-              <a:buClr>
-                <a:schemeClr val="accent2"/>
-              </a:buClr>
-              <a:buFont typeface="Wingdings"/>
-              <a:buChar char="§"/>
-              <a:defRPr kumimoji="0" sz="1800" kern="1200" baseline="0">
-                <a:solidFill>
-                  <a:schemeClr val="tx1"/>
-                </a:solidFill>
-                <a:latin typeface="+mn-lt"/>
-                <a:ea typeface="+mn-ea"/>
-                <a:cs typeface="+mn-cs"/>
-              </a:defRPr>
-            </a:lvl7pPr>
-            <a:lvl8pPr marL="2651760" indent="-228600" algn="l" rtl="0" eaLnBrk="1" latinLnBrk="0" hangingPunct="1">
-              <a:spcBef>
-                <a:spcPct val="20000"/>
-              </a:spcBef>
-              <a:buClr>
-                <a:schemeClr val="accent3"/>
-              </a:buClr>
-              <a:buFont typeface="Wingdings"/>
-              <a:buChar char="§"/>
-              <a:defRPr kumimoji="0" sz="1800" kern="1200" baseline="0">
-                <a:solidFill>
-                  <a:schemeClr val="tx1"/>
-                </a:solidFill>
-                <a:latin typeface="+mn-lt"/>
-                <a:ea typeface="+mn-ea"/>
-                <a:cs typeface="+mn-cs"/>
-              </a:defRPr>
-            </a:lvl8pPr>
-            <a:lvl9pPr marL="2926080" indent="-228600" algn="l" rtl="0" eaLnBrk="1" latinLnBrk="0" hangingPunct="1">
-              <a:spcBef>
-                <a:spcPct val="20000"/>
-              </a:spcBef>
-              <a:buClr>
-                <a:schemeClr val="accent4"/>
-              </a:buClr>
-              <a:buFont typeface="Wingdings"/>
-              <a:buChar char="§"/>
-              <a:defRPr kumimoji="0" sz="1800" kern="1200" baseline="0">
-                <a:solidFill>
-                  <a:schemeClr val="tx1"/>
-                </a:solidFill>
-                <a:latin typeface="+mn-lt"/>
-                <a:ea typeface="+mn-ea"/>
-                <a:cs typeface="+mn-cs"/>
-              </a:defRPr>
-            </a:lvl9pPr>
-          </a:lstStyle>
-          <a:p>
-            <a:pPr marL="0" indent="0" algn="ctr" defTabSz="914400">
-              <a:buFont typeface="Arial" charset="0"/>
-              <a:buNone/>
-            </a:pPr>
-            <a:r>
-              <a:rPr lang="en-GB" sz="3000" b="1" dirty="0"/>
-              <a:t>Power Point Presentation</a:t>
-            </a:r>
-            <a:r>
-              <a:rPr lang="en-GB" sz="2800" b="1" dirty="0"/>
-              <a:t> </a:t>
-            </a:r>
-          </a:p>
-          <a:p>
-            <a:pPr marL="0" indent="0" algn="ctr" defTabSz="914400">
-              <a:buFont typeface="Arial" charset="0"/>
-              <a:buNone/>
-            </a:pPr>
-            <a:r>
-              <a:rPr lang="en-GB" sz="2800" dirty="0"/>
-              <a:t>Design and sample slides</a:t>
-            </a:r>
-          </a:p>
-          <a:p>
-            <a:pPr defTabSz="914400"/>
-            <a:endParaRPr lang="en-GB" dirty="0"/>
-          </a:p>
-        </p:txBody>
-      </p:sp>
-    </p:spTree>
-    <p:extLst>
-      <p:ext uri="{BB962C8B-B14F-4D97-AF65-F5344CB8AC3E}">
-        <p14:creationId xmlns:p14="http://schemas.microsoft.com/office/powerpoint/2010/main" val="3675729712"/>
-      </p:ext>
-    </p:extLst>
-  </p:cSld>
-  <p:clrMapOvr>
-    <a:masterClrMapping/>
-  </p:clrMapOvr>
-</p:sld>
-</file>
-
-<file path=ppt/slides/slide12.xml><?xml version="1.0" encoding="utf-8"?>
-<p:sld xmlns:a="http://schemas.openxmlformats.org/drawingml/2006/main" xmlns:r="http://schemas.openxmlformats.org/officeDocument/2006/relationships" xmlns:p="http://schemas.openxmlformats.org/presentationml/2006/main">
-  <p:cSld>
-    <p:spTree>
-      <p:nvGrpSpPr>
-        <p:cNvPr id="1" name=""/>
-        <p:cNvGrpSpPr/>
-        <p:nvPr/>
-      </p:nvGrpSpPr>
-      <p:grpSpPr>
-        <a:xfrm>
-          <a:off x="0" y="0"/>
-          <a:ext cx="0" cy="0"/>
-          <a:chOff x="0" y="0"/>
-          <a:chExt cx="0" cy="0"/>
-        </a:xfrm>
-      </p:grpSpPr>
-      <p:sp>
-        <p:nvSpPr>
-          <p:cNvPr id="2" name="Titel 1"/>
-          <p:cNvSpPr>
-            <a:spLocks noGrp="1"/>
-          </p:cNvSpPr>
-          <p:nvPr>
-            <p:ph type="title"/>
-          </p:nvPr>
-        </p:nvSpPr>
-        <p:spPr/>
-        <p:txBody>
-          <a:bodyPr/>
-          <a:lstStyle/>
-          <a:p>
-            <a:r>
-              <a:rPr lang="en-GB" dirty="0"/>
-              <a:t>Placeholder for a headline</a:t>
-            </a:r>
-          </a:p>
-        </p:txBody>
-      </p:sp>
-      <p:sp>
-        <p:nvSpPr>
-          <p:cNvPr id="3" name="Inhaltsplatzhalter 2"/>
-          <p:cNvSpPr>
-            <a:spLocks noGrp="1"/>
-          </p:cNvSpPr>
-          <p:nvPr>
-            <p:ph sz="quarter" idx="1"/>
-          </p:nvPr>
-        </p:nvSpPr>
-        <p:spPr/>
-        <p:txBody>
-          <a:bodyPr/>
-          <a:lstStyle/>
-          <a:p>
-            <a:pPr marL="0" lvl="0" indent="0">
-              <a:buNone/>
-            </a:pPr>
-            <a:r>
-              <a:rPr lang="en-GB" dirty="0"/>
-              <a:t>Type your copy text here …</a:t>
-            </a:r>
-          </a:p>
-          <a:p>
-            <a:endParaRPr lang="en-GB" dirty="0"/>
-          </a:p>
-          <a:p>
-            <a:pPr marL="0" indent="0">
-              <a:buNone/>
-            </a:pPr>
-            <a:r>
-              <a:rPr lang="en-GB" b="1" dirty="0"/>
-              <a:t>Bullet list:</a:t>
-            </a:r>
-          </a:p>
-          <a:p>
-            <a:r>
-              <a:rPr lang="en-GB" dirty="0"/>
-              <a:t>First item</a:t>
-            </a:r>
-          </a:p>
-          <a:p>
-            <a:r>
-              <a:rPr lang="en-GB" dirty="0"/>
-              <a:t>Second item</a:t>
-            </a:r>
-          </a:p>
-          <a:p>
-            <a:r>
-              <a:rPr lang="en-GB" dirty="0"/>
-              <a:t>Third item</a:t>
-            </a:r>
-          </a:p>
-          <a:p>
-            <a:pPr lvl="1"/>
-            <a:r>
-              <a:rPr lang="en-GB" dirty="0"/>
-              <a:t>First sub item</a:t>
-            </a:r>
-          </a:p>
-          <a:p>
-            <a:pPr lvl="1"/>
-            <a:r>
-              <a:rPr lang="en-GB" dirty="0"/>
-              <a:t>Second sub item</a:t>
-            </a:r>
-          </a:p>
-        </p:txBody>
-      </p:sp>
-      <p:sp>
-        <p:nvSpPr>
-          <p:cNvPr id="4" name="Fußzeilenplatzhalter 3"/>
-          <p:cNvSpPr>
-            <a:spLocks noGrp="1"/>
-          </p:cNvSpPr>
-          <p:nvPr>
-            <p:ph type="ftr" sz="quarter" idx="3"/>
-          </p:nvPr>
-        </p:nvSpPr>
-        <p:spPr/>
-        <p:txBody>
-          <a:bodyPr/>
-          <a:lstStyle/>
-          <a:p>
-            <a:pPr>
-              <a:defRPr/>
-            </a:pPr>
-            <a:r>
-              <a:rPr lang="en-GB" dirty="0"/>
-              <a:t>This project has received funding from the European Union’s Horizon 2020 research and innovation programme under grant agreement No 826078</a:t>
-            </a:r>
-          </a:p>
-        </p:txBody>
-      </p:sp>
-    </p:spTree>
-    <p:extLst>
-      <p:ext uri="{BB962C8B-B14F-4D97-AF65-F5344CB8AC3E}">
-        <p14:creationId xmlns:p14="http://schemas.microsoft.com/office/powerpoint/2010/main" val="80903361"/>
-      </p:ext>
-    </p:extLst>
-  </p:cSld>
-  <p:clrMapOvr>
-    <a:masterClrMapping/>
-  </p:clrMapOvr>
-</p:sld>
-</file>
-
-<file path=ppt/slides/slide13.xml><?xml version="1.0" encoding="utf-8"?>
-<p:sld xmlns:a="http://schemas.openxmlformats.org/drawingml/2006/main" xmlns:r="http://schemas.openxmlformats.org/officeDocument/2006/relationships" xmlns:p="http://schemas.openxmlformats.org/presentationml/2006/main">
-  <p:cSld>
-    <p:spTree>
-      <p:nvGrpSpPr>
-        <p:cNvPr id="1" name=""/>
-        <p:cNvGrpSpPr/>
-        <p:nvPr/>
-      </p:nvGrpSpPr>
-      <p:grpSpPr>
-        <a:xfrm>
-          <a:off x="0" y="0"/>
-          <a:ext cx="0" cy="0"/>
-          <a:chOff x="0" y="0"/>
-          <a:chExt cx="0" cy="0"/>
-        </a:xfrm>
-      </p:grpSpPr>
-      <p:sp>
-        <p:nvSpPr>
-          <p:cNvPr id="2" name="Titel 1"/>
-          <p:cNvSpPr>
-            <a:spLocks noGrp="1"/>
-          </p:cNvSpPr>
-          <p:nvPr>
-            <p:ph type="title"/>
-          </p:nvPr>
-        </p:nvSpPr>
-        <p:spPr/>
-        <p:txBody>
-          <a:bodyPr/>
-          <a:lstStyle/>
-          <a:p>
-            <a:r>
-              <a:rPr lang="en-GB" dirty="0"/>
-              <a:t>FeatureCloud colour </a:t>
-            </a:r>
-            <a:r>
-              <a:rPr lang="en-GB" dirty="0">
-                <a:latin typeface="Arial" charset="0"/>
-                <a:ea typeface="ＭＳ Ｐゴシック" charset="0"/>
-              </a:rPr>
-              <a:t>palette</a:t>
-            </a:r>
-            <a:endParaRPr lang="en-GB" dirty="0"/>
-          </a:p>
-        </p:txBody>
-      </p:sp>
-      <p:sp>
-        <p:nvSpPr>
-          <p:cNvPr id="4" name="Fußzeilenplatzhalter 3"/>
-          <p:cNvSpPr>
-            <a:spLocks noGrp="1"/>
-          </p:cNvSpPr>
-          <p:nvPr>
-            <p:ph type="ftr" sz="quarter" idx="3"/>
-          </p:nvPr>
-        </p:nvSpPr>
-        <p:spPr/>
-        <p:txBody>
-          <a:bodyPr/>
-          <a:lstStyle/>
-          <a:p>
-            <a:pPr>
-              <a:defRPr/>
-            </a:pPr>
-            <a:r>
-              <a:rPr lang="en-GB" dirty="0"/>
-              <a:t>This project has received funding from the European Union’s Horizon 2020 research and innovation programme under grant agreement No 826078</a:t>
-            </a:r>
-          </a:p>
-        </p:txBody>
-      </p:sp>
-      <p:sp>
-        <p:nvSpPr>
-          <p:cNvPr id="6" name="Rechteck 5"/>
-          <p:cNvSpPr/>
-          <p:nvPr/>
-        </p:nvSpPr>
-        <p:spPr>
-          <a:xfrm>
-            <a:off x="481426" y="2010988"/>
-            <a:ext cx="1439863" cy="1439862"/>
-          </a:xfrm>
-          <a:prstGeom prst="rect">
-            <a:avLst/>
-          </a:prstGeom>
-          <a:solidFill>
-            <a:schemeClr val="tx1"/>
-          </a:solidFill>
-          <a:ln>
-            <a:noFill/>
-          </a:ln>
-          <a:effectLst/>
-        </p:spPr>
-        <p:style>
-          <a:lnRef idx="1">
-            <a:schemeClr val="accent1"/>
-          </a:lnRef>
-          <a:fillRef idx="3">
-            <a:schemeClr val="accent1"/>
-          </a:fillRef>
-          <a:effectRef idx="2">
-            <a:schemeClr val="accent1"/>
-          </a:effectRef>
-          <a:fontRef idx="minor">
-            <a:schemeClr val="lt1"/>
-          </a:fontRef>
-        </p:style>
-        <p:txBody>
-          <a:bodyPr tIns="0" rIns="0" bIns="0" anchor="ctr"/>
-          <a:lstStyle/>
-          <a:p>
-            <a:pPr algn="ctr">
-              <a:defRPr/>
-            </a:pPr>
-            <a:endParaRPr lang="en-GB" sz="1800" dirty="0">
-              <a:ln>
-                <a:solidFill>
-                  <a:schemeClr val="accent1">
-                    <a:lumMod val="20000"/>
-                    <a:lumOff val="80000"/>
-                  </a:schemeClr>
-                </a:solidFill>
-              </a:ln>
-              <a:solidFill>
-                <a:schemeClr val="bg1"/>
-              </a:solidFill>
-              <a:latin typeface=""/>
-            </a:endParaRPr>
-          </a:p>
-        </p:txBody>
-      </p:sp>
-      <p:sp>
-        <p:nvSpPr>
-          <p:cNvPr id="7" name="Rechteck 6"/>
-          <p:cNvSpPr/>
-          <p:nvPr/>
-        </p:nvSpPr>
-        <p:spPr>
-          <a:xfrm>
-            <a:off x="2461039" y="2010988"/>
-            <a:ext cx="1439862" cy="1439862"/>
-          </a:xfrm>
-          <a:prstGeom prst="rect">
-            <a:avLst/>
-          </a:prstGeom>
-          <a:solidFill>
-            <a:schemeClr val="tx2"/>
-          </a:solidFill>
-          <a:ln>
-            <a:noFill/>
-          </a:ln>
-          <a:effectLst/>
-        </p:spPr>
-        <p:style>
-          <a:lnRef idx="1">
-            <a:schemeClr val="accent1"/>
-          </a:lnRef>
-          <a:fillRef idx="3">
-            <a:schemeClr val="accent1"/>
-          </a:fillRef>
-          <a:effectRef idx="2">
-            <a:schemeClr val="accent1"/>
-          </a:effectRef>
-          <a:fontRef idx="minor">
-            <a:schemeClr val="lt1"/>
-          </a:fontRef>
-        </p:style>
-        <p:txBody>
-          <a:bodyPr anchor="ctr"/>
-          <a:lstStyle/>
-          <a:p>
-            <a:pPr algn="ctr">
-              <a:defRPr/>
-            </a:pPr>
-            <a:endParaRPr lang="en-GB" sz="1800" dirty="0">
-              <a:solidFill>
-                <a:srgbClr val="1C89CA"/>
-              </a:solidFill>
-            </a:endParaRPr>
-          </a:p>
-        </p:txBody>
-      </p:sp>
-      <p:sp>
-        <p:nvSpPr>
-          <p:cNvPr id="8" name="Rechteck 11"/>
-          <p:cNvSpPr>
-            <a:spLocks noChangeArrowheads="1"/>
-          </p:cNvSpPr>
-          <p:nvPr/>
-        </p:nvSpPr>
-        <p:spPr bwMode="auto">
-          <a:xfrm>
-            <a:off x="487777" y="3652042"/>
-            <a:ext cx="1578626" cy="492443"/>
-          </a:xfrm>
-          <a:prstGeom prst="rect">
-            <a:avLst/>
-          </a:prstGeom>
-          <a:noFill/>
-          <a:ln>
-            <a:noFill/>
-          </a:ln>
-          <a:extLst>
-            <a:ext uri="{909E8E84-426E-40DD-AFC4-6F175D3DCCD1}">
-              <a14:hiddenFill xmlns:a14="http://schemas.microsoft.com/office/drawing/2010/main">
-                <a:solidFill>
-                  <a:srgbClr val="FFFFFF"/>
-                </a:solidFill>
-              </a14:hiddenFill>
-            </a:ext>
-            <a:ext uri="{91240B29-F687-4F45-9708-019B960494DF}">
-              <a14:hiddenLine xmlns:a14="http://schemas.microsoft.com/office/drawing/2010/main" w="9525">
-                <a:solidFill>
-                  <a:srgbClr val="000000"/>
-                </a:solidFill>
-                <a:miter lim="800000"/>
-                <a:headEnd/>
-                <a:tailEnd/>
-              </a14:hiddenLine>
-            </a:ext>
-          </a:extLst>
-        </p:spPr>
-        <p:txBody>
-          <a:bodyPr wrap="square" lIns="0" tIns="0" rIns="0" bIns="0">
-            <a:spAutoFit/>
-          </a:bodyPr>
-          <a:lstStyle/>
-          <a:p>
-            <a:r>
-              <a:rPr lang="en-GB" sz="1800" b="1" dirty="0"/>
-              <a:t>Data blue</a:t>
-            </a:r>
-            <a:br>
-              <a:rPr lang="en-GB" sz="1800" b="1" dirty="0"/>
-            </a:br>
-            <a:r>
-              <a:rPr lang="en-GB" sz="1400" dirty="0"/>
-              <a:t>0 R 70 G 150 B</a:t>
-            </a:r>
-            <a:endParaRPr lang="en-GB" sz="1400" b="1" dirty="0"/>
-          </a:p>
-        </p:txBody>
-      </p:sp>
-      <p:sp>
-        <p:nvSpPr>
-          <p:cNvPr id="9" name="Rechteck 12"/>
-          <p:cNvSpPr>
-            <a:spLocks noChangeArrowheads="1"/>
-          </p:cNvSpPr>
-          <p:nvPr/>
-        </p:nvSpPr>
-        <p:spPr bwMode="auto">
-          <a:xfrm>
-            <a:off x="2461040" y="3652042"/>
-            <a:ext cx="1547474" cy="492443"/>
-          </a:xfrm>
-          <a:prstGeom prst="rect">
-            <a:avLst/>
-          </a:prstGeom>
-          <a:noFill/>
-          <a:ln>
-            <a:noFill/>
-          </a:ln>
-          <a:extLst>
-            <a:ext uri="{909E8E84-426E-40DD-AFC4-6F175D3DCCD1}">
-              <a14:hiddenFill xmlns:a14="http://schemas.microsoft.com/office/drawing/2010/main">
-                <a:solidFill>
-                  <a:srgbClr val="FFFFFF"/>
-                </a:solidFill>
-              </a14:hiddenFill>
-            </a:ext>
-            <a:ext uri="{91240B29-F687-4F45-9708-019B960494DF}">
-              <a14:hiddenLine xmlns:a14="http://schemas.microsoft.com/office/drawing/2010/main" w="9525">
-                <a:solidFill>
-                  <a:srgbClr val="000000"/>
-                </a:solidFill>
-                <a:miter lim="800000"/>
-                <a:headEnd/>
-                <a:tailEnd/>
-              </a14:hiddenLine>
-            </a:ext>
-          </a:extLst>
-        </p:spPr>
-        <p:txBody>
-          <a:bodyPr wrap="square" lIns="0" tIns="0" rIns="0" bIns="0">
-            <a:spAutoFit/>
-          </a:bodyPr>
-          <a:lstStyle/>
-          <a:p>
-            <a:r>
-              <a:rPr lang="en-GB" sz="1800" b="1" dirty="0"/>
-              <a:t>Cloud blue</a:t>
-            </a:r>
-          </a:p>
-          <a:p>
-            <a:r>
-              <a:rPr lang="en-GB" sz="1400" dirty="0"/>
-              <a:t>30 R 190 G 230 B</a:t>
-            </a:r>
-          </a:p>
-        </p:txBody>
-      </p:sp>
-      <p:sp>
-        <p:nvSpPr>
-          <p:cNvPr id="10" name="Rechteck 9"/>
-          <p:cNvSpPr/>
-          <p:nvPr/>
-        </p:nvSpPr>
-        <p:spPr>
-          <a:xfrm>
-            <a:off x="4295538" y="2010988"/>
-            <a:ext cx="1439862" cy="1439862"/>
-          </a:xfrm>
-          <a:prstGeom prst="rect">
-            <a:avLst/>
-          </a:prstGeom>
-          <a:solidFill>
-            <a:schemeClr val="accent2"/>
-          </a:solidFill>
-          <a:ln>
-            <a:noFill/>
-          </a:ln>
-          <a:effectLst/>
-        </p:spPr>
-        <p:style>
-          <a:lnRef idx="1">
-            <a:schemeClr val="accent1"/>
-          </a:lnRef>
-          <a:fillRef idx="3">
-            <a:schemeClr val="accent1"/>
-          </a:fillRef>
-          <a:effectRef idx="2">
-            <a:schemeClr val="accent1"/>
-          </a:effectRef>
-          <a:fontRef idx="minor">
-            <a:schemeClr val="lt1"/>
-          </a:fontRef>
-        </p:style>
-        <p:txBody>
-          <a:bodyPr anchor="ctr"/>
-          <a:lstStyle/>
-          <a:p>
-            <a:pPr algn="ctr">
-              <a:defRPr/>
-            </a:pPr>
-            <a:endParaRPr lang="en-GB" sz="1800" dirty="0">
-              <a:solidFill>
-                <a:srgbClr val="1C89CA"/>
-              </a:solidFill>
-            </a:endParaRPr>
-          </a:p>
-        </p:txBody>
-      </p:sp>
-      <p:sp>
-        <p:nvSpPr>
-          <p:cNvPr id="11" name="Rechteck 12"/>
-          <p:cNvSpPr>
-            <a:spLocks noChangeArrowheads="1"/>
-          </p:cNvSpPr>
-          <p:nvPr/>
-        </p:nvSpPr>
-        <p:spPr bwMode="auto">
-          <a:xfrm>
-            <a:off x="4295538" y="3652042"/>
-            <a:ext cx="1734253" cy="492443"/>
-          </a:xfrm>
-          <a:prstGeom prst="rect">
-            <a:avLst/>
-          </a:prstGeom>
-          <a:noFill/>
-          <a:ln>
-            <a:noFill/>
-          </a:ln>
-          <a:extLst>
-            <a:ext uri="{909E8E84-426E-40DD-AFC4-6F175D3DCCD1}">
-              <a14:hiddenFill xmlns:a14="http://schemas.microsoft.com/office/drawing/2010/main">
-                <a:solidFill>
-                  <a:srgbClr val="FFFFFF"/>
-                </a:solidFill>
-              </a14:hiddenFill>
-            </a:ext>
-            <a:ext uri="{91240B29-F687-4F45-9708-019B960494DF}">
-              <a14:hiddenLine xmlns:a14="http://schemas.microsoft.com/office/drawing/2010/main" w="9525">
-                <a:solidFill>
-                  <a:srgbClr val="000000"/>
-                </a:solidFill>
-                <a:miter lim="800000"/>
-                <a:headEnd/>
-                <a:tailEnd/>
-              </a14:hiddenLine>
-            </a:ext>
-          </a:extLst>
-        </p:spPr>
-        <p:txBody>
-          <a:bodyPr wrap="square" lIns="0" tIns="0" rIns="0" bIns="0">
-            <a:spAutoFit/>
-          </a:bodyPr>
-          <a:lstStyle/>
-          <a:p>
-            <a:r>
-              <a:rPr lang="en-GB" sz="1800" b="1" dirty="0"/>
-              <a:t>Safety green</a:t>
-            </a:r>
-          </a:p>
-          <a:p>
-            <a:r>
-              <a:rPr lang="en-GB" sz="1400" dirty="0"/>
-              <a:t>200 R 210 G 0B</a:t>
-            </a:r>
-          </a:p>
-        </p:txBody>
-      </p:sp>
-    </p:spTree>
-    <p:extLst>
-      <p:ext uri="{BB962C8B-B14F-4D97-AF65-F5344CB8AC3E}">
-        <p14:creationId xmlns:p14="http://schemas.microsoft.com/office/powerpoint/2010/main" val="1206392221"/>
-      </p:ext>
-    </p:extLst>
-  </p:cSld>
-  <p:clrMapOvr>
-    <a:masterClrMapping/>
-  </p:clrMapOvr>
-</p:sld>
-</file>
-
-<file path=ppt/slides/slide14.xml><?xml version="1.0" encoding="utf-8"?>
-<p:sld xmlns:a="http://schemas.openxmlformats.org/drawingml/2006/main" xmlns:r="http://schemas.openxmlformats.org/officeDocument/2006/relationships" xmlns:p="http://schemas.openxmlformats.org/presentationml/2006/main">
-  <p:cSld>
-    <p:spTree>
-      <p:nvGrpSpPr>
-        <p:cNvPr id="1" name=""/>
-        <p:cNvGrpSpPr/>
-        <p:nvPr/>
-      </p:nvGrpSpPr>
-      <p:grpSpPr>
-        <a:xfrm>
-          <a:off x="0" y="0"/>
-          <a:ext cx="0" cy="0"/>
-          <a:chOff x="0" y="0"/>
-          <a:chExt cx="0" cy="0"/>
-        </a:xfrm>
-      </p:grpSpPr>
-      <p:sp>
-        <p:nvSpPr>
-          <p:cNvPr id="2" name="Titel 1"/>
-          <p:cNvSpPr>
-            <a:spLocks noGrp="1"/>
-          </p:cNvSpPr>
-          <p:nvPr>
-            <p:ph type="title"/>
-          </p:nvPr>
-        </p:nvSpPr>
-        <p:spPr/>
-        <p:txBody>
-          <a:bodyPr/>
-          <a:lstStyle/>
-          <a:p>
-            <a:r>
-              <a:rPr lang="en-GB" dirty="0"/>
-              <a:t>FeatureCloud table design</a:t>
-            </a:r>
-          </a:p>
-        </p:txBody>
-      </p:sp>
-      <p:sp>
-        <p:nvSpPr>
-          <p:cNvPr id="4" name="Fußzeilenplatzhalter 3"/>
-          <p:cNvSpPr>
-            <a:spLocks noGrp="1"/>
-          </p:cNvSpPr>
-          <p:nvPr>
-            <p:ph type="ftr" sz="quarter" idx="3"/>
-          </p:nvPr>
-        </p:nvSpPr>
-        <p:spPr/>
-        <p:txBody>
-          <a:bodyPr/>
-          <a:lstStyle/>
-          <a:p>
-            <a:pPr>
-              <a:defRPr/>
-            </a:pPr>
-            <a:r>
-              <a:rPr lang="en-GB" dirty="0"/>
-              <a:t>This project has received funding from the European Union’s Horizon 2020 research and innovation programme under grant agreement No 826078</a:t>
-            </a:r>
-          </a:p>
-        </p:txBody>
-      </p:sp>
-      <p:graphicFrame>
-        <p:nvGraphicFramePr>
-          <p:cNvPr id="12" name="Tabelle 11"/>
-          <p:cNvGraphicFramePr>
-            <a:graphicFrameLocks noGrp="1"/>
-          </p:cNvGraphicFramePr>
-          <p:nvPr>
-            <p:extLst>
-              <p:ext uri="{D42A27DB-BD31-4B8C-83A1-F6EECF244321}">
-                <p14:modId xmlns:p14="http://schemas.microsoft.com/office/powerpoint/2010/main" val="1572962280"/>
-              </p:ext>
-            </p:extLst>
-          </p:nvPr>
-        </p:nvGraphicFramePr>
-        <p:xfrm>
-          <a:off x="481426" y="2361850"/>
-          <a:ext cx="8022495" cy="2225040"/>
-        </p:xfrm>
-        <a:graphic>
-          <a:graphicData uri="http://schemas.openxmlformats.org/drawingml/2006/table">
-            <a:tbl>
-              <a:tblPr firstRow="1" bandRow="1">
-                <a:tableStyleId>{5C22544A-7EE6-4342-B048-85BDC9FD1C3A}</a:tableStyleId>
-              </a:tblPr>
-              <a:tblGrid>
-                <a:gridCol w="2703734">
-                  <a:extLst>
-                    <a:ext uri="{9D8B030D-6E8A-4147-A177-3AD203B41FA5}">
-                      <a16:colId xmlns:a16="http://schemas.microsoft.com/office/drawing/2014/main" val="20000"/>
-                    </a:ext>
-                  </a:extLst>
-                </a:gridCol>
-                <a:gridCol w="2644596">
-                  <a:extLst>
-                    <a:ext uri="{9D8B030D-6E8A-4147-A177-3AD203B41FA5}">
-                      <a16:colId xmlns:a16="http://schemas.microsoft.com/office/drawing/2014/main" val="20001"/>
-                    </a:ext>
-                  </a:extLst>
-                </a:gridCol>
-                <a:gridCol w="2674165">
-                  <a:extLst>
-                    <a:ext uri="{9D8B030D-6E8A-4147-A177-3AD203B41FA5}">
-                      <a16:colId xmlns:a16="http://schemas.microsoft.com/office/drawing/2014/main" val="20002"/>
-                    </a:ext>
-                  </a:extLst>
-                </a:gridCol>
-              </a:tblGrid>
-              <a:tr h="370840">
-                <a:tc>
-                  <a:txBody>
-                    <a:bodyPr/>
-                    <a:lstStyle/>
-                    <a:p>
-                      <a:r>
-                        <a:rPr lang="en-GB" dirty="0">
-                          <a:latin typeface="Arial" panose="020B0604020202020204" pitchFamily="34" charset="0"/>
-                          <a:cs typeface="Arial" panose="020B0604020202020204" pitchFamily="34" charset="0"/>
-                        </a:rPr>
-                        <a:t>Table Header</a:t>
-                      </a:r>
-                    </a:p>
-                  </a:txBody>
-                  <a:tcPr>
-                    <a:solidFill>
-                      <a:srgbClr val="113283"/>
-                    </a:solidFill>
-                  </a:tcPr>
-                </a:tc>
-                <a:tc>
-                  <a:txBody>
-                    <a:bodyPr/>
-                    <a:lstStyle/>
-                    <a:p>
-                      <a:endParaRPr lang="en-GB"/>
-                    </a:p>
-                  </a:txBody>
-                  <a:tcPr>
-                    <a:solidFill>
-                      <a:srgbClr val="113283"/>
-                    </a:solidFill>
-                  </a:tcPr>
-                </a:tc>
-                <a:tc>
-                  <a:txBody>
-                    <a:bodyPr/>
-                    <a:lstStyle/>
-                    <a:p>
-                      <a:endParaRPr lang="en-GB" dirty="0"/>
-                    </a:p>
-                  </a:txBody>
-                  <a:tcPr>
-                    <a:solidFill>
-                      <a:srgbClr val="113283"/>
-                    </a:solidFill>
-                  </a:tcPr>
-                </a:tc>
-                <a:extLst>
-                  <a:ext uri="{0D108BD9-81ED-4DB2-BD59-A6C34878D82A}">
-                    <a16:rowId xmlns:a16="http://schemas.microsoft.com/office/drawing/2014/main" val="10000"/>
-                  </a:ext>
-                </a:extLst>
-              </a:tr>
-              <a:tr h="370840">
-                <a:tc>
-                  <a:txBody>
-                    <a:bodyPr/>
-                    <a:lstStyle/>
-                    <a:p>
-                      <a:r>
-                        <a:rPr lang="en-GB" dirty="0">
-                          <a:latin typeface="Arial" panose="020B0604020202020204" pitchFamily="34" charset="0"/>
-                          <a:cs typeface="Arial" panose="020B0604020202020204" pitchFamily="34" charset="0"/>
-                        </a:rPr>
-                        <a:t>Body content</a:t>
-                      </a:r>
-                    </a:p>
-                  </a:txBody>
-                  <a:tcPr>
-                    <a:solidFill>
-                      <a:schemeClr val="bg2">
-                        <a:lumMod val="75000"/>
-                      </a:schemeClr>
-                    </a:solidFill>
-                  </a:tcPr>
-                </a:tc>
-                <a:tc>
-                  <a:txBody>
-                    <a:bodyPr/>
-                    <a:lstStyle/>
-                    <a:p>
-                      <a:endParaRPr lang="en-GB" dirty="0">
-                        <a:latin typeface="Arial" panose="020B0604020202020204" pitchFamily="34" charset="0"/>
-                        <a:cs typeface="Arial" panose="020B0604020202020204" pitchFamily="34" charset="0"/>
-                      </a:endParaRPr>
-                    </a:p>
-                  </a:txBody>
-                  <a:tcPr>
-                    <a:solidFill>
-                      <a:schemeClr val="bg2">
-                        <a:lumMod val="75000"/>
-                      </a:schemeClr>
-                    </a:solidFill>
-                  </a:tcPr>
-                </a:tc>
-                <a:tc>
-                  <a:txBody>
-                    <a:bodyPr/>
-                    <a:lstStyle/>
-                    <a:p>
-                      <a:endParaRPr lang="en-GB" dirty="0">
-                        <a:latin typeface="Arial" panose="020B0604020202020204" pitchFamily="34" charset="0"/>
-                        <a:cs typeface="Arial" panose="020B0604020202020204" pitchFamily="34" charset="0"/>
-                      </a:endParaRPr>
-                    </a:p>
-                  </a:txBody>
-                  <a:tcPr>
-                    <a:solidFill>
-                      <a:schemeClr val="bg2">
-                        <a:lumMod val="75000"/>
-                      </a:schemeClr>
-                    </a:solidFill>
-                  </a:tcPr>
-                </a:tc>
-                <a:extLst>
-                  <a:ext uri="{0D108BD9-81ED-4DB2-BD59-A6C34878D82A}">
-                    <a16:rowId xmlns:a16="http://schemas.microsoft.com/office/drawing/2014/main" val="10001"/>
-                  </a:ext>
-                </a:extLst>
-              </a:tr>
-              <a:tr h="370840">
-                <a:tc>
-                  <a:txBody>
-                    <a:bodyPr/>
-                    <a:lstStyle/>
-                    <a:p>
-                      <a:endParaRPr lang="en-GB" dirty="0">
-                        <a:latin typeface="Arial" panose="020B0604020202020204" pitchFamily="34" charset="0"/>
-                        <a:cs typeface="Arial" panose="020B0604020202020204" pitchFamily="34" charset="0"/>
-                      </a:endParaRPr>
-                    </a:p>
-                  </a:txBody>
-                  <a:tcPr>
-                    <a:solidFill>
-                      <a:schemeClr val="bg2">
-                        <a:lumMod val="85000"/>
-                      </a:schemeClr>
-                    </a:solidFill>
-                  </a:tcPr>
-                </a:tc>
-                <a:tc>
-                  <a:txBody>
-                    <a:bodyPr/>
-                    <a:lstStyle/>
-                    <a:p>
-                      <a:endParaRPr lang="en-GB" dirty="0">
-                        <a:latin typeface="Arial" panose="020B0604020202020204" pitchFamily="34" charset="0"/>
-                        <a:cs typeface="Arial" panose="020B0604020202020204" pitchFamily="34" charset="0"/>
-                      </a:endParaRPr>
-                    </a:p>
-                  </a:txBody>
-                  <a:tcPr>
-                    <a:solidFill>
-                      <a:schemeClr val="bg2">
-                        <a:lumMod val="85000"/>
-                      </a:schemeClr>
-                    </a:solidFill>
-                  </a:tcPr>
-                </a:tc>
-                <a:tc>
-                  <a:txBody>
-                    <a:bodyPr/>
-                    <a:lstStyle/>
-                    <a:p>
-                      <a:endParaRPr lang="en-GB" dirty="0">
-                        <a:latin typeface="Arial" panose="020B0604020202020204" pitchFamily="34" charset="0"/>
-                        <a:cs typeface="Arial" panose="020B0604020202020204" pitchFamily="34" charset="0"/>
-                      </a:endParaRPr>
-                    </a:p>
-                  </a:txBody>
-                  <a:tcPr>
-                    <a:solidFill>
-                      <a:schemeClr val="bg2">
-                        <a:lumMod val="85000"/>
-                      </a:schemeClr>
-                    </a:solidFill>
-                  </a:tcPr>
-                </a:tc>
-                <a:extLst>
-                  <a:ext uri="{0D108BD9-81ED-4DB2-BD59-A6C34878D82A}">
-                    <a16:rowId xmlns:a16="http://schemas.microsoft.com/office/drawing/2014/main" val="10002"/>
-                  </a:ext>
-                </a:extLst>
-              </a:tr>
-              <a:tr h="370840">
-                <a:tc>
-                  <a:txBody>
-                    <a:bodyPr/>
-                    <a:lstStyle/>
-                    <a:p>
-                      <a:endParaRPr lang="en-GB" dirty="0">
-                        <a:latin typeface="Arial" panose="020B0604020202020204" pitchFamily="34" charset="0"/>
-                        <a:cs typeface="Arial" panose="020B0604020202020204" pitchFamily="34" charset="0"/>
-                      </a:endParaRPr>
-                    </a:p>
-                  </a:txBody>
-                  <a:tcPr>
-                    <a:solidFill>
-                      <a:schemeClr val="bg2">
-                        <a:lumMod val="75000"/>
-                      </a:schemeClr>
-                    </a:solidFill>
-                  </a:tcPr>
-                </a:tc>
-                <a:tc>
-                  <a:txBody>
-                    <a:bodyPr/>
-                    <a:lstStyle/>
-                    <a:p>
-                      <a:endParaRPr lang="en-GB" dirty="0">
-                        <a:latin typeface="Arial" panose="020B0604020202020204" pitchFamily="34" charset="0"/>
-                        <a:cs typeface="Arial" panose="020B0604020202020204" pitchFamily="34" charset="0"/>
-                      </a:endParaRPr>
-                    </a:p>
-                  </a:txBody>
-                  <a:tcPr>
-                    <a:solidFill>
-                      <a:schemeClr val="bg2">
-                        <a:lumMod val="75000"/>
-                      </a:schemeClr>
-                    </a:solidFill>
-                  </a:tcPr>
-                </a:tc>
-                <a:tc>
-                  <a:txBody>
-                    <a:bodyPr/>
-                    <a:lstStyle/>
-                    <a:p>
-                      <a:endParaRPr lang="en-GB" dirty="0">
-                        <a:latin typeface="Arial" panose="020B0604020202020204" pitchFamily="34" charset="0"/>
-                        <a:cs typeface="Arial" panose="020B0604020202020204" pitchFamily="34" charset="0"/>
-                      </a:endParaRPr>
-                    </a:p>
-                  </a:txBody>
-                  <a:tcPr>
-                    <a:solidFill>
-                      <a:schemeClr val="bg2">
-                        <a:lumMod val="75000"/>
-                      </a:schemeClr>
-                    </a:solidFill>
-                  </a:tcPr>
-                </a:tc>
-                <a:extLst>
-                  <a:ext uri="{0D108BD9-81ED-4DB2-BD59-A6C34878D82A}">
-                    <a16:rowId xmlns:a16="http://schemas.microsoft.com/office/drawing/2014/main" val="10003"/>
-                  </a:ext>
-                </a:extLst>
-              </a:tr>
-              <a:tr h="370840">
-                <a:tc>
-                  <a:txBody>
-                    <a:bodyPr/>
-                    <a:lstStyle/>
-                    <a:p>
-                      <a:endParaRPr lang="en-GB" dirty="0">
-                        <a:latin typeface="Arial" panose="020B0604020202020204" pitchFamily="34" charset="0"/>
-                        <a:cs typeface="Arial" panose="020B0604020202020204" pitchFamily="34" charset="0"/>
-                      </a:endParaRPr>
-                    </a:p>
-                  </a:txBody>
-                  <a:tcPr>
-                    <a:solidFill>
-                      <a:schemeClr val="bg2">
-                        <a:lumMod val="85000"/>
-                      </a:schemeClr>
-                    </a:solidFill>
-                  </a:tcPr>
-                </a:tc>
-                <a:tc>
-                  <a:txBody>
-                    <a:bodyPr/>
-                    <a:lstStyle/>
-                    <a:p>
-                      <a:endParaRPr lang="en-GB" dirty="0">
-                        <a:latin typeface="Arial" panose="020B0604020202020204" pitchFamily="34" charset="0"/>
-                        <a:cs typeface="Arial" panose="020B0604020202020204" pitchFamily="34" charset="0"/>
-                      </a:endParaRPr>
-                    </a:p>
-                  </a:txBody>
-                  <a:tcPr>
-                    <a:solidFill>
-                      <a:schemeClr val="bg2">
-                        <a:lumMod val="85000"/>
-                      </a:schemeClr>
-                    </a:solidFill>
-                  </a:tcPr>
-                </a:tc>
-                <a:tc>
-                  <a:txBody>
-                    <a:bodyPr/>
-                    <a:lstStyle/>
-                    <a:p>
-                      <a:endParaRPr lang="en-GB" dirty="0">
-                        <a:latin typeface="Arial" panose="020B0604020202020204" pitchFamily="34" charset="0"/>
-                        <a:cs typeface="Arial" panose="020B0604020202020204" pitchFamily="34" charset="0"/>
-                      </a:endParaRPr>
-                    </a:p>
-                  </a:txBody>
-                  <a:tcPr>
-                    <a:solidFill>
-                      <a:schemeClr val="bg2">
-                        <a:lumMod val="85000"/>
-                      </a:schemeClr>
-                    </a:solidFill>
-                  </a:tcPr>
-                </a:tc>
-                <a:extLst>
-                  <a:ext uri="{0D108BD9-81ED-4DB2-BD59-A6C34878D82A}">
-                    <a16:rowId xmlns:a16="http://schemas.microsoft.com/office/drawing/2014/main" val="10004"/>
-                  </a:ext>
-                </a:extLst>
-              </a:tr>
-              <a:tr h="370840">
-                <a:tc>
-                  <a:txBody>
-                    <a:bodyPr/>
-                    <a:lstStyle/>
-                    <a:p>
-                      <a:endParaRPr lang="en-GB" dirty="0">
-                        <a:latin typeface="Arial" panose="020B0604020202020204" pitchFamily="34" charset="0"/>
-                        <a:cs typeface="Arial" panose="020B0604020202020204" pitchFamily="34" charset="0"/>
-                      </a:endParaRPr>
-                    </a:p>
-                  </a:txBody>
-                  <a:tcPr>
-                    <a:solidFill>
-                      <a:schemeClr val="bg2">
-                        <a:lumMod val="75000"/>
-                      </a:schemeClr>
-                    </a:solidFill>
-                  </a:tcPr>
-                </a:tc>
-                <a:tc>
-                  <a:txBody>
-                    <a:bodyPr/>
-                    <a:lstStyle/>
-                    <a:p>
-                      <a:endParaRPr lang="en-GB" dirty="0">
-                        <a:latin typeface="Arial" panose="020B0604020202020204" pitchFamily="34" charset="0"/>
-                        <a:cs typeface="Arial" panose="020B0604020202020204" pitchFamily="34" charset="0"/>
-                      </a:endParaRPr>
-                    </a:p>
-                  </a:txBody>
-                  <a:tcPr>
-                    <a:solidFill>
-                      <a:schemeClr val="bg2">
-                        <a:lumMod val="75000"/>
-                      </a:schemeClr>
-                    </a:solidFill>
-                  </a:tcPr>
-                </a:tc>
-                <a:tc>
-                  <a:txBody>
-                    <a:bodyPr/>
-                    <a:lstStyle/>
-                    <a:p>
-                      <a:endParaRPr lang="en-GB" dirty="0">
-                        <a:latin typeface="Arial" panose="020B0604020202020204" pitchFamily="34" charset="0"/>
-                        <a:cs typeface="Arial" panose="020B0604020202020204" pitchFamily="34" charset="0"/>
-                      </a:endParaRPr>
-                    </a:p>
-                  </a:txBody>
-                  <a:tcPr>
-                    <a:solidFill>
-                      <a:schemeClr val="bg2">
-                        <a:lumMod val="75000"/>
-                      </a:schemeClr>
-                    </a:solidFill>
-                  </a:tcPr>
-                </a:tc>
-                <a:extLst>
-                  <a:ext uri="{0D108BD9-81ED-4DB2-BD59-A6C34878D82A}">
-                    <a16:rowId xmlns:a16="http://schemas.microsoft.com/office/drawing/2014/main" val="10005"/>
-                  </a:ext>
-                </a:extLst>
-              </a:tr>
-            </a:tbl>
-          </a:graphicData>
-        </a:graphic>
-      </p:graphicFrame>
-    </p:spTree>
-    <p:extLst>
-      <p:ext uri="{BB962C8B-B14F-4D97-AF65-F5344CB8AC3E}">
-        <p14:creationId xmlns:p14="http://schemas.microsoft.com/office/powerpoint/2010/main" val="4212826135"/>
-      </p:ext>
-    </p:extLst>
-  </p:cSld>
-  <p:clrMapOvr>
-    <a:masterClrMapping/>
-  </p:clrMapOvr>
-</p:sld>
-</file>
-
-<file path=ppt/slides/slide15.xml><?xml version="1.0" encoding="utf-8"?>
-<p:sld xmlns:a="http://schemas.openxmlformats.org/drawingml/2006/main" xmlns:r="http://schemas.openxmlformats.org/officeDocument/2006/relationships" xmlns:p="http://schemas.openxmlformats.org/presentationml/2006/main">
-  <p:cSld>
-    <p:spTree>
-      <p:nvGrpSpPr>
-        <p:cNvPr id="1" name=""/>
-        <p:cNvGrpSpPr/>
-        <p:nvPr/>
-      </p:nvGrpSpPr>
-      <p:grpSpPr>
-        <a:xfrm>
-          <a:off x="0" y="0"/>
-          <a:ext cx="0" cy="0"/>
-          <a:chOff x="0" y="0"/>
-          <a:chExt cx="0" cy="0"/>
-        </a:xfrm>
-      </p:grpSpPr>
-      <p:sp>
-        <p:nvSpPr>
-          <p:cNvPr id="2" name="Fußzeilenplatzhalter 1"/>
-          <p:cNvSpPr>
-            <a:spLocks noGrp="1"/>
-          </p:cNvSpPr>
-          <p:nvPr>
-            <p:ph type="ftr" sz="quarter" idx="3"/>
-          </p:nvPr>
-        </p:nvSpPr>
-        <p:spPr/>
-        <p:txBody>
-          <a:bodyPr/>
-          <a:lstStyle/>
-          <a:p>
-            <a:pPr>
-              <a:defRPr/>
-            </a:pPr>
-            <a:r>
-              <a:rPr lang="en-GB" dirty="0"/>
-              <a:t>This project has received funding from the European Union’s Horizon 2020 research and innovation programme under grant agreement No 826078</a:t>
-            </a:r>
-          </a:p>
-        </p:txBody>
-      </p:sp>
-    </p:spTree>
-    <p:extLst>
-      <p:ext uri="{BB962C8B-B14F-4D97-AF65-F5344CB8AC3E}">
-        <p14:creationId xmlns:p14="http://schemas.microsoft.com/office/powerpoint/2010/main" val="173488271"/>
+        <p14:creationId xmlns:p14="http://schemas.microsoft.com/office/powerpoint/2010/main" val="4039423577"/>
       </p:ext>
     </p:extLst>
   </p:cSld>
@@ -6426,56 +5064,186 @@
             <p:ph sz="quarter" idx="1"/>
           </p:nvPr>
         </p:nvSpPr>
-        <p:spPr/>
+        <p:spPr>
+          <a:xfrm>
+            <a:off x="481426" y="1173600"/>
+            <a:ext cx="8101255" cy="4658400"/>
+          </a:xfrm>
+        </p:spPr>
         <p:txBody>
           <a:bodyPr/>
           <a:lstStyle/>
           <a:p>
-            <a:pPr marL="0" lvl="0" indent="0">
-              <a:buNone/>
-            </a:pPr>
-            <a:r>
-              <a:rPr lang="en-GB" b="1" dirty="0"/>
-              <a:t>Please briefly describe your progress on milestones and deliverables of your WP here: </a:t>
-            </a:r>
-          </a:p>
-          <a:p>
-            <a:pPr marL="0" indent="0">
-              <a:buNone/>
-            </a:pPr>
-            <a:endParaRPr lang="en-GB" b="1" dirty="0"/>
-          </a:p>
-          <a:p>
-            <a:r>
-              <a:rPr lang="en-GB" dirty="0"/>
-              <a:t>First item</a:t>
-            </a:r>
-          </a:p>
-          <a:p>
-            <a:r>
-              <a:rPr lang="en-GB" dirty="0"/>
-              <a:t>Second item</a:t>
-            </a:r>
-          </a:p>
-          <a:p>
-            <a:r>
-              <a:rPr lang="en-GB" dirty="0"/>
-              <a:t>Third item</a:t>
+            <a:r>
+              <a:rPr lang="en-GB" dirty="0">
+                <a:solidFill>
+                  <a:schemeClr val="tx1"/>
+                </a:solidFill>
+                <a:latin typeface="Arial" panose="020B0604020202020204" pitchFamily="34" charset="0"/>
+                <a:cs typeface="Arial" panose="020B0604020202020204" pitchFamily="34" charset="0"/>
+              </a:rPr>
+              <a:t>Our </a:t>
+            </a:r>
+            <a:r>
+              <a:rPr lang="en-GB" b="0" dirty="0">
+                <a:solidFill>
+                  <a:schemeClr val="tx1"/>
+                </a:solidFill>
+                <a:effectLst/>
+                <a:latin typeface="Arial" panose="020B0604020202020204" pitchFamily="34" charset="0"/>
+                <a:cs typeface="Arial" panose="020B0604020202020204" pitchFamily="34" charset="0"/>
+              </a:rPr>
+              <a:t>original thought was to tackle graphs in a traditional way</a:t>
             </a:r>
           </a:p>
           <a:p>
             <a:pPr lvl="1"/>
             <a:r>
-              <a:rPr lang="en-GB" dirty="0"/>
-              <a:t> First sub item</a:t>
+              <a:rPr lang="en-GB" sz="1600" b="0" dirty="0">
+                <a:solidFill>
+                  <a:schemeClr val="tx1"/>
+                </a:solidFill>
+                <a:effectLst/>
+                <a:latin typeface="Arial" panose="020B0604020202020204" pitchFamily="34" charset="0"/>
+                <a:cs typeface="Arial" panose="020B0604020202020204" pitchFamily="34" charset="0"/>
+              </a:rPr>
+              <a:t>assume a global (connected) graph</a:t>
             </a:r>
           </a:p>
           <a:p>
             <a:pPr lvl="1"/>
             <a:r>
-              <a:rPr lang="en-GB" dirty="0"/>
-              <a:t> Second sub item</a:t>
-            </a:r>
+              <a:rPr lang="en-GB" sz="1600" b="0" dirty="0">
+                <a:solidFill>
+                  <a:schemeClr val="tx1"/>
+                </a:solidFill>
+                <a:effectLst/>
+                <a:latin typeface="Arial" panose="020B0604020202020204" pitchFamily="34" charset="0"/>
+                <a:cs typeface="Arial" panose="020B0604020202020204" pitchFamily="34" charset="0"/>
+              </a:rPr>
+              <a:t>distribute it optimally or not via partitioning (KL, MCMF, RW, …)</a:t>
+            </a:r>
+          </a:p>
+          <a:p>
+            <a:r>
+              <a:rPr lang="en-GB" dirty="0">
+                <a:solidFill>
+                  <a:schemeClr val="tx1"/>
+                </a:solidFill>
+                <a:latin typeface="Arial" panose="020B0604020202020204" pitchFamily="34" charset="0"/>
+                <a:cs typeface="Arial" panose="020B0604020202020204" pitchFamily="34" charset="0"/>
+              </a:rPr>
+              <a:t>T</a:t>
+            </a:r>
+            <a:r>
+              <a:rPr lang="en-GB" b="0" dirty="0">
+                <a:solidFill>
+                  <a:schemeClr val="tx1"/>
+                </a:solidFill>
+                <a:effectLst/>
+                <a:latin typeface="Arial" panose="020B0604020202020204" pitchFamily="34" charset="0"/>
+                <a:cs typeface="Arial" panose="020B0604020202020204" pitchFamily="34" charset="0"/>
+              </a:rPr>
+              <a:t>his idea came from an experimental mindset, where we assumed having a certain dataset which we could compute globally </a:t>
+            </a:r>
+          </a:p>
+          <a:p>
+            <a:pPr lvl="1"/>
+            <a:r>
+              <a:rPr lang="en-GB" sz="1600" b="0" dirty="0">
+                <a:solidFill>
+                  <a:schemeClr val="tx1"/>
+                </a:solidFill>
+                <a:effectLst/>
+                <a:latin typeface="Arial" panose="020B0604020202020204" pitchFamily="34" charset="0"/>
+                <a:cs typeface="Arial" panose="020B0604020202020204" pitchFamily="34" charset="0"/>
+              </a:rPr>
+              <a:t>then split the data &amp; compare with distributed results</a:t>
+            </a:r>
+            <a:endParaRPr lang="en-GB" sz="800" b="0" dirty="0">
+              <a:solidFill>
+                <a:schemeClr val="tx1"/>
+              </a:solidFill>
+              <a:effectLst/>
+              <a:latin typeface="Arial" panose="020B0604020202020204" pitchFamily="34" charset="0"/>
+              <a:cs typeface="Arial" panose="020B0604020202020204" pitchFamily="34" charset="0"/>
+            </a:endParaRPr>
+          </a:p>
+          <a:p>
+            <a:r>
+              <a:rPr lang="en-GB" dirty="0">
+                <a:solidFill>
+                  <a:schemeClr val="tx1"/>
+                </a:solidFill>
+                <a:latin typeface="Arial" panose="020B0604020202020204" pitchFamily="34" charset="0"/>
+                <a:cs typeface="Arial" panose="020B0604020202020204" pitchFamily="34" charset="0"/>
+              </a:rPr>
+              <a:t>R</a:t>
+            </a:r>
+            <a:r>
+              <a:rPr lang="en-GB" b="0" dirty="0">
+                <a:solidFill>
+                  <a:schemeClr val="tx1"/>
+                </a:solidFill>
+                <a:effectLst/>
+                <a:latin typeface="Arial" panose="020B0604020202020204" pitchFamily="34" charset="0"/>
+                <a:cs typeface="Arial" panose="020B0604020202020204" pitchFamily="34" charset="0"/>
+              </a:rPr>
+              <a:t>eality however will actually determine datasets and their locality (distribution for us. Also, graph types will never be ”text-book pure”</a:t>
+            </a:r>
+          </a:p>
+          <a:p>
+            <a:r>
+              <a:rPr lang="en-GB" b="0" dirty="0">
+                <a:solidFill>
+                  <a:schemeClr val="tx1"/>
+                </a:solidFill>
+                <a:effectLst/>
+                <a:latin typeface="Arial" panose="020B0604020202020204" pitchFamily="34" charset="0"/>
+                <a:cs typeface="Arial" panose="020B0604020202020204" pitchFamily="34" charset="0"/>
+              </a:rPr>
+              <a:t>Also, in modern network representation learning approaches (RW-based  / GCNs) strict graph classes are rarely (never) mentioned</a:t>
+            </a:r>
+          </a:p>
+          <a:p>
+            <a:r>
+              <a:rPr lang="en-GB" dirty="0">
+                <a:solidFill>
+                  <a:schemeClr val="tx1"/>
+                </a:solidFill>
+                <a:latin typeface="Arial" panose="020B0604020202020204" pitchFamily="34" charset="0"/>
+                <a:cs typeface="Arial" panose="020B0604020202020204" pitchFamily="34" charset="0"/>
+              </a:rPr>
+              <a:t>Quick experiments: graph (sim) recommenders / w|d2v|ft embeddings</a:t>
+            </a:r>
+            <a:endParaRPr lang="en-GB" b="0" dirty="0">
+              <a:solidFill>
+                <a:schemeClr val="tx1"/>
+              </a:solidFill>
+              <a:effectLst/>
+              <a:latin typeface="Arial" panose="020B0604020202020204" pitchFamily="34" charset="0"/>
+              <a:cs typeface="Arial" panose="020B0604020202020204" pitchFamily="34" charset="0"/>
+            </a:endParaRPr>
+          </a:p>
+          <a:p>
+            <a:r>
+              <a:rPr lang="en-GB" dirty="0">
+                <a:solidFill>
+                  <a:schemeClr val="tx1"/>
+                </a:solidFill>
+                <a:latin typeface="Arial" panose="020B0604020202020204" pitchFamily="34" charset="0"/>
+                <a:cs typeface="Arial" panose="020B0604020202020204" pitchFamily="34" charset="0"/>
+              </a:rPr>
+              <a:t>Conclusion: The formulation of our original work packages and tasks changed rather significantly towards GRL &amp; node / graph embeddings…</a:t>
+            </a:r>
+            <a:endParaRPr lang="en-GB" b="0" dirty="0">
+              <a:solidFill>
+                <a:schemeClr val="tx1"/>
+              </a:solidFill>
+              <a:effectLst/>
+              <a:latin typeface="Arial" panose="020B0604020202020204" pitchFamily="34" charset="0"/>
+              <a:cs typeface="Arial" panose="020B0604020202020204" pitchFamily="34" charset="0"/>
+            </a:endParaRPr>
           </a:p>
         </p:txBody>
       </p:sp>
@@ -6536,6 +5304,283 @@
       </p:grpSpPr>
       <p:sp>
         <p:nvSpPr>
+          <p:cNvPr id="2" name="Titel 1"/>
+          <p:cNvSpPr>
+            <a:spLocks noGrp="1"/>
+          </p:cNvSpPr>
+          <p:nvPr>
+            <p:ph type="title"/>
+          </p:nvPr>
+        </p:nvSpPr>
+        <p:spPr/>
+        <p:txBody>
+          <a:bodyPr/>
+          <a:lstStyle/>
+          <a:p>
+            <a:r>
+              <a:rPr lang="en-GB" dirty="0"/>
+              <a:t>WP4 – What have we learned? </a:t>
+            </a:r>
+          </a:p>
+        </p:txBody>
+      </p:sp>
+      <p:sp>
+        <p:nvSpPr>
+          <p:cNvPr id="3" name="Inhaltsplatzhalter 2"/>
+          <p:cNvSpPr>
+            <a:spLocks noGrp="1"/>
+          </p:cNvSpPr>
+          <p:nvPr>
+            <p:ph sz="quarter" idx="1"/>
+          </p:nvPr>
+        </p:nvSpPr>
+        <p:spPr>
+          <a:xfrm>
+            <a:off x="417600" y="1137600"/>
+            <a:ext cx="8244974" cy="4802400"/>
+          </a:xfrm>
+        </p:spPr>
+        <p:txBody>
+          <a:bodyPr/>
+          <a:lstStyle/>
+          <a:p>
+            <a:r>
+              <a:rPr lang="en-GB" dirty="0">
+                <a:solidFill>
+                  <a:schemeClr val="tx1"/>
+                </a:solidFill>
+                <a:latin typeface="Arial" panose="020B0604020202020204" pitchFamily="34" charset="0"/>
+                <a:cs typeface="Arial" panose="020B0604020202020204" pitchFamily="34" charset="0"/>
+              </a:rPr>
+              <a:t>C</a:t>
+            </a:r>
+            <a:r>
+              <a:rPr lang="en-GB" b="0" dirty="0">
+                <a:solidFill>
+                  <a:schemeClr val="tx1"/>
+                </a:solidFill>
+                <a:effectLst/>
+                <a:latin typeface="Arial" panose="020B0604020202020204" pitchFamily="34" charset="0"/>
+                <a:cs typeface="Arial" panose="020B0604020202020204" pitchFamily="34" charset="0"/>
+              </a:rPr>
+              <a:t>annot use spectral graph theory (e.g. feeding an Adjacency or Laplace matrix into a CNN)</a:t>
+            </a:r>
+          </a:p>
+          <a:p>
+            <a:pPr lvl="1"/>
+            <a:r>
+              <a:rPr lang="en-GB" sz="1600" b="0" dirty="0">
+                <a:solidFill>
+                  <a:schemeClr val="tx1"/>
+                </a:solidFill>
+                <a:effectLst/>
+                <a:latin typeface="Arial" panose="020B0604020202020204" pitchFamily="34" charset="0"/>
+                <a:cs typeface="Arial" panose="020B0604020202020204" pitchFamily="34" charset="0"/>
+              </a:rPr>
+              <a:t>this would assume we know all nodes in beforehand</a:t>
+            </a:r>
+          </a:p>
+          <a:p>
+            <a:pPr lvl="1"/>
+            <a:r>
+              <a:rPr lang="en-GB" sz="1600" b="0" dirty="0">
+                <a:solidFill>
+                  <a:schemeClr val="tx1"/>
+                </a:solidFill>
+                <a:effectLst/>
+                <a:latin typeface="Arial" panose="020B0604020202020204" pitchFamily="34" charset="0"/>
+                <a:cs typeface="Arial" panose="020B0604020202020204" pitchFamily="34" charset="0"/>
+              </a:rPr>
+              <a:t>every change in the graph would trigger a complete re-computation</a:t>
+            </a:r>
+          </a:p>
+          <a:p>
+            <a:pPr lvl="1"/>
+            <a:r>
+              <a:rPr lang="en-GB" sz="1600" b="0" dirty="0">
+                <a:solidFill>
+                  <a:schemeClr val="tx1"/>
+                </a:solidFill>
+                <a:effectLst/>
+                <a:latin typeface="Arial" panose="020B0604020202020204" pitchFamily="34" charset="0"/>
+                <a:cs typeface="Arial" panose="020B0604020202020204" pitchFamily="34" charset="0"/>
+              </a:rPr>
+              <a:t>also unrealistic on distributed graphs, or if parts of the data are sensitive</a:t>
+            </a:r>
+          </a:p>
+          <a:p>
+            <a:r>
+              <a:rPr lang="en-GB" dirty="0">
+                <a:solidFill>
+                  <a:schemeClr val="tx1"/>
+                </a:solidFill>
+                <a:latin typeface="Arial" panose="020B0604020202020204" pitchFamily="34" charset="0"/>
+                <a:cs typeface="Arial" panose="020B0604020202020204" pitchFamily="34" charset="0"/>
+              </a:rPr>
+              <a:t>C</a:t>
+            </a:r>
+            <a:r>
+              <a:rPr lang="en-GB" b="0" dirty="0">
+                <a:solidFill>
+                  <a:schemeClr val="tx1"/>
+                </a:solidFill>
+                <a:effectLst/>
+                <a:latin typeface="Arial" panose="020B0604020202020204" pitchFamily="34" charset="0"/>
+                <a:cs typeface="Arial" panose="020B0604020202020204" pitchFamily="34" charset="0"/>
+              </a:rPr>
+              <a:t>annot use transductive methods (which propagate labels based on some proximity assumption)</a:t>
+            </a:r>
+          </a:p>
+          <a:p>
+            <a:pPr lvl="1"/>
+            <a:r>
+              <a:rPr lang="en-GB" sz="1600" b="0" dirty="0">
+                <a:solidFill>
+                  <a:schemeClr val="tx1"/>
+                </a:solidFill>
+                <a:effectLst/>
+                <a:latin typeface="Arial" panose="020B0604020202020204" pitchFamily="34" charset="0"/>
+                <a:cs typeface="Arial" panose="020B0604020202020204" pitchFamily="34" charset="0"/>
+              </a:rPr>
+              <a:t>with a random walk (like deepwalk), it depends whether the local graphs are sizeable enough for expressive vectors. </a:t>
+            </a:r>
+          </a:p>
+          <a:p>
+            <a:r>
+              <a:rPr lang="en-GB" dirty="0">
+                <a:solidFill>
+                  <a:schemeClr val="tx1"/>
+                </a:solidFill>
+                <a:latin typeface="Arial" panose="020B0604020202020204" pitchFamily="34" charset="0"/>
+                <a:cs typeface="Arial" panose="020B0604020202020204" pitchFamily="34" charset="0"/>
+              </a:rPr>
+              <a:t>T</a:t>
+            </a:r>
+            <a:r>
+              <a:rPr lang="en-GB" b="0" dirty="0">
+                <a:solidFill>
+                  <a:schemeClr val="tx1"/>
+                </a:solidFill>
+                <a:effectLst/>
+                <a:latin typeface="Arial" panose="020B0604020202020204" pitchFamily="34" charset="0"/>
+                <a:cs typeface="Arial" panose="020B0604020202020204" pitchFamily="34" charset="0"/>
+              </a:rPr>
+              <a:t>herefore, neighbourhood-aggregation is much more promising</a:t>
+            </a:r>
+          </a:p>
+          <a:p>
+            <a:pPr lvl="1"/>
+            <a:r>
+              <a:rPr lang="en-GB" sz="1600" b="0" dirty="0">
+                <a:solidFill>
+                  <a:schemeClr val="tx1"/>
+                </a:solidFill>
+                <a:effectLst/>
+                <a:latin typeface="Arial" panose="020B0604020202020204" pitchFamily="34" charset="0"/>
+                <a:cs typeface="Arial" panose="020B0604020202020204" pitchFamily="34" charset="0"/>
+              </a:rPr>
+              <a:t>can be sampled for each node =&gt; built-in parallelization</a:t>
+            </a:r>
+          </a:p>
+          <a:p>
+            <a:pPr lvl="1"/>
+            <a:r>
+              <a:rPr lang="en-GB" sz="1600" b="0" dirty="0">
+                <a:solidFill>
+                  <a:schemeClr val="tx1"/>
+                </a:solidFill>
+                <a:effectLst/>
+                <a:latin typeface="Arial" panose="020B0604020202020204" pitchFamily="34" charset="0"/>
+                <a:cs typeface="Arial" panose="020B0604020202020204" pitchFamily="34" charset="0"/>
+              </a:rPr>
+              <a:t>don't need to compute the whole graph at once</a:t>
+            </a:r>
+          </a:p>
+          <a:p>
+            <a:pPr lvl="1"/>
+            <a:r>
+              <a:rPr lang="en-GB" sz="1600" b="0" dirty="0">
+                <a:solidFill>
+                  <a:schemeClr val="tx1"/>
+                </a:solidFill>
+                <a:effectLst/>
+                <a:latin typeface="Arial" panose="020B0604020202020204" pitchFamily="34" charset="0"/>
+                <a:cs typeface="Arial" panose="020B0604020202020204" pitchFamily="34" charset="0"/>
+              </a:rPr>
+              <a:t>can learn weight matrices forming an inductive model, so we can classify previously unseen nodes later on</a:t>
+            </a:r>
+          </a:p>
+          <a:p>
+            <a:pPr marL="0" lvl="0" indent="0">
+              <a:buNone/>
+            </a:pPr>
+            <a:endParaRPr lang="en-GB" dirty="0">
+              <a:solidFill>
+                <a:schemeClr val="tx1"/>
+              </a:solidFill>
+              <a:latin typeface="Arial" panose="020B0604020202020204" pitchFamily="34" charset="0"/>
+              <a:cs typeface="Arial" panose="020B0604020202020204" pitchFamily="34" charset="0"/>
+            </a:endParaRPr>
+          </a:p>
+        </p:txBody>
+      </p:sp>
+      <p:sp>
+        <p:nvSpPr>
+          <p:cNvPr id="4" name="Fußzeilenplatzhalter 3"/>
+          <p:cNvSpPr>
+            <a:spLocks noGrp="1"/>
+          </p:cNvSpPr>
+          <p:nvPr>
+            <p:ph type="ftr" sz="quarter" idx="3"/>
+          </p:nvPr>
+        </p:nvSpPr>
+        <p:spPr/>
+        <p:txBody>
+          <a:bodyPr/>
+          <a:lstStyle/>
+          <a:p>
+            <a:pPr>
+              <a:defRPr/>
+            </a:pPr>
+            <a:r>
+              <a:rPr lang="en-GB" dirty="0"/>
+              <a:t>This project has received funding from the European Union’s Horizon 2020 research and innovation programme under grant agreement No 826078</a:t>
+            </a:r>
+          </a:p>
+        </p:txBody>
+      </p:sp>
+    </p:spTree>
+    <p:extLst>
+      <p:ext uri="{BB962C8B-B14F-4D97-AF65-F5344CB8AC3E}">
+        <p14:creationId xmlns:p14="http://schemas.microsoft.com/office/powerpoint/2010/main" val="1755911748"/>
+      </p:ext>
+    </p:extLst>
+  </p:cSld>
+  <p:clrMapOvr>
+    <a:masterClrMapping/>
+  </p:clrMapOvr>
+</p:sld>
+</file>
+
+<file path=ppt/slides/slide5.xml><?xml version="1.0" encoding="utf-8"?>
+<p:sld xmlns:a="http://schemas.openxmlformats.org/drawingml/2006/main" xmlns:r="http://schemas.openxmlformats.org/officeDocument/2006/relationships" xmlns:p="http://schemas.openxmlformats.org/presentationml/2006/main">
+  <p:cSld>
+    <p:spTree>
+      <p:nvGrpSpPr>
+        <p:cNvPr id="1" name=""/>
+        <p:cNvGrpSpPr/>
+        <p:nvPr/>
+      </p:nvGrpSpPr>
+      <p:grpSpPr>
+        <a:xfrm>
+          <a:off x="0" y="0"/>
+          <a:ext cx="0" cy="0"/>
+          <a:chOff x="0" y="0"/>
+          <a:chExt cx="0" cy="0"/>
+        </a:xfrm>
+      </p:grpSpPr>
+      <p:sp>
+        <p:nvSpPr>
           <p:cNvPr id="2" name="Title 1">
             <a:extLst>
               <a:ext uri="{FF2B5EF4-FFF2-40B4-BE49-F238E27FC236}">
@@ -6550,12 +5595,28 @@
             <p:ph type="title"/>
           </p:nvPr>
         </p:nvSpPr>
-        <p:spPr/>
+        <p:spPr>
+          <a:xfrm>
+            <a:off x="409212" y="632154"/>
+            <a:ext cx="6905988" cy="904226"/>
+          </a:xfrm>
+        </p:spPr>
         <p:txBody>
           <a:bodyPr/>
           <a:lstStyle/>
           <a:p>
-            <a:endParaRPr lang="en-US" dirty="0"/>
+            <a:r>
+              <a:rPr lang="en-US" dirty="0"/>
+              <a:t>WP4 – Schematic overview of </a:t>
+            </a:r>
+            <a:r>
+              <a:rPr lang="en-US" dirty="0" err="1"/>
+              <a:t>neighbourhood</a:t>
+            </a:r>
+            <a:r>
+              <a:rPr lang="en-US" dirty="0"/>
+              <a:t> aggregation (GraphSAGE)</a:t>
+            </a:r>
           </a:p>
         </p:txBody>
       </p:sp>
@@ -6617,8 +5678,8 @@
         </p:blipFill>
         <p:spPr>
           <a:xfrm>
-            <a:off x="706207" y="2035847"/>
-            <a:ext cx="4813736" cy="1962150"/>
+            <a:off x="5199495" y="1111609"/>
+            <a:ext cx="3743456" cy="1525888"/>
           </a:xfrm>
           <a:prstGeom prst="rect">
             <a:avLst/>
@@ -6627,26 +5688,300 @@
       </p:pic>
       <p:sp>
         <p:nvSpPr>
-          <p:cNvPr id="9" name="Content Placeholder 8">
+          <p:cNvPr id="7" name="TextBox 6">
             <a:extLst>
               <a:ext uri="{FF2B5EF4-FFF2-40B4-BE49-F238E27FC236}">
-                <a16:creationId xmlns:a16="http://schemas.microsoft.com/office/drawing/2014/main" id="{CA342E1A-5EF8-4145-9E2A-3B32179C1D90}"/>
+                <a16:creationId xmlns:a16="http://schemas.microsoft.com/office/drawing/2014/main" id="{4A5B7192-DAAE-44C2-844E-CAAEE3B64B04}"/>
               </a:ext>
             </a:extLst>
           </p:cNvPr>
-          <p:cNvSpPr>
-            <a:spLocks noGrp="1"/>
-          </p:cNvSpPr>
-          <p:nvPr>
-            <p:ph sz="quarter" idx="1"/>
-          </p:nvPr>
+          <p:cNvSpPr txBox="1"/>
+          <p:nvPr/>
         </p:nvSpPr>
-        <p:spPr/>
+        <p:spPr>
+          <a:xfrm>
+            <a:off x="285341" y="1915268"/>
+            <a:ext cx="4310216" cy="861774"/>
+          </a:xfrm>
+          <a:prstGeom prst="rect">
+            <a:avLst/>
+          </a:prstGeom>
+          <a:noFill/>
+        </p:spPr>
         <p:txBody>
-          <a:bodyPr/>
+          <a:bodyPr wrap="square">
+            <a:spAutoFit/>
+          </a:bodyPr>
           <a:lstStyle/>
           <a:p>
-            <a:endParaRPr lang="en-US" dirty="0"/>
+            <a:pPr marR="0" lvl="0" algn="just">
+              <a:spcBef>
+                <a:spcPts val="0"/>
+              </a:spcBef>
+              <a:spcAft>
+                <a:spcPts val="0"/>
+              </a:spcAft>
+            </a:pPr>
+            <a:r>
+              <a:rPr lang="en-GB" sz="1000" dirty="0">
+                <a:solidFill>
+                  <a:srgbClr val="000000"/>
+                </a:solidFill>
+                <a:effectLst/>
+                <a:latin typeface="Arial" panose="020B0604020202020204" pitchFamily="34" charset="0"/>
+                <a:ea typeface="Arial" panose="020B0604020202020204" pitchFamily="34" charset="0"/>
+              </a:rPr>
+              <a:t>Rex Ying, Ruining He, Kaifeng Chen, Pong </a:t>
+            </a:r>
+            <a:r>
+              <a:rPr lang="en-GB" sz="1000" dirty="0" err="1">
+                <a:solidFill>
+                  <a:srgbClr val="000000"/>
+                </a:solidFill>
+                <a:effectLst/>
+                <a:latin typeface="Arial" panose="020B0604020202020204" pitchFamily="34" charset="0"/>
+                <a:ea typeface="Arial" panose="020B0604020202020204" pitchFamily="34" charset="0"/>
+              </a:rPr>
+              <a:t>Eksombatchai</a:t>
+            </a:r>
+            <a:r>
+              <a:rPr lang="en-GB" sz="1000" dirty="0">
+                <a:solidFill>
+                  <a:srgbClr val="000000"/>
+                </a:solidFill>
+                <a:effectLst/>
+                <a:latin typeface="Arial" panose="020B0604020202020204" pitchFamily="34" charset="0"/>
+                <a:ea typeface="Arial" panose="020B0604020202020204" pitchFamily="34" charset="0"/>
+              </a:rPr>
+              <a:t>, William L. Hamilton, and Jure Leskovec. Graph convolutional neural networks for web-scale recommender systems. Proceedings of the ACM SIGKDD International Conference on Knowledge Discovery and Data Mining, pages 974–983, 2018. </a:t>
+            </a:r>
+            <a:r>
+              <a:rPr lang="en-GB" sz="1000" dirty="0" err="1">
+                <a:solidFill>
+                  <a:srgbClr val="000000"/>
+                </a:solidFill>
+                <a:effectLst/>
+                <a:latin typeface="Arial" panose="020B0604020202020204" pitchFamily="34" charset="0"/>
+                <a:ea typeface="Arial" panose="020B0604020202020204" pitchFamily="34" charset="0"/>
+              </a:rPr>
+              <a:t>doi</a:t>
+            </a:r>
+            <a:r>
+              <a:rPr lang="en-GB" sz="1000" dirty="0">
+                <a:solidFill>
+                  <a:srgbClr val="000000"/>
+                </a:solidFill>
+                <a:effectLst/>
+                <a:latin typeface="Arial" panose="020B0604020202020204" pitchFamily="34" charset="0"/>
+                <a:ea typeface="Arial" panose="020B0604020202020204" pitchFamily="34" charset="0"/>
+              </a:rPr>
+              <a:t>: 10.1145/3219819.3219890.</a:t>
+            </a:r>
+            <a:endParaRPr lang="en-US" sz="1000" dirty="0">
+              <a:effectLst/>
+              <a:latin typeface="Arial" panose="020B0604020202020204" pitchFamily="34" charset="0"/>
+              <a:ea typeface="Arial" panose="020B0604020202020204" pitchFamily="34" charset="0"/>
+            </a:endParaRPr>
+          </a:p>
+        </p:txBody>
+      </p:sp>
+      <p:sp>
+        <p:nvSpPr>
+          <p:cNvPr id="10" name="TextBox 9">
+            <a:extLst>
+              <a:ext uri="{FF2B5EF4-FFF2-40B4-BE49-F238E27FC236}">
+                <a16:creationId xmlns:a16="http://schemas.microsoft.com/office/drawing/2014/main" id="{B1C6D309-F871-4448-85A4-A272AD66C9E9}"/>
+              </a:ext>
+            </a:extLst>
+          </p:cNvPr>
+          <p:cNvSpPr txBox="1"/>
+          <p:nvPr/>
+        </p:nvSpPr>
+        <p:spPr>
+          <a:xfrm>
+            <a:off x="5428800" y="2637497"/>
+            <a:ext cx="3614400" cy="707886"/>
+          </a:xfrm>
+          <a:prstGeom prst="rect">
+            <a:avLst/>
+          </a:prstGeom>
+          <a:noFill/>
+        </p:spPr>
+        <p:txBody>
+          <a:bodyPr wrap="square">
+            <a:spAutoFit/>
+          </a:bodyPr>
+          <a:lstStyle/>
+          <a:p>
+            <a:r>
+              <a:rPr lang="en-GB" sz="1000" dirty="0"/>
+              <a:t>W. L. Hamilton, R. Ying, J. Leskovec, Inductive representation learning on large graphs, Advances in Neural Information Processing Systems 2017- </a:t>
+            </a:r>
+            <a:r>
+              <a:rPr lang="en-GB" sz="1000" dirty="0" err="1"/>
+              <a:t>Decem</a:t>
+            </a:r>
+            <a:r>
+              <a:rPr lang="en-GB" sz="1000" dirty="0"/>
+              <a:t> (Nips) (2017) 1025–1035. arXiv:1706.02216.</a:t>
+            </a:r>
+            <a:endParaRPr lang="en-US" sz="1000" dirty="0"/>
+          </a:p>
+        </p:txBody>
+      </p:sp>
+      <p:pic>
+        <p:nvPicPr>
+          <p:cNvPr id="11" name="Picture 10" descr="A close up of a map&#10;&#10;Description automatically generated">
+            <a:extLst>
+              <a:ext uri="{FF2B5EF4-FFF2-40B4-BE49-F238E27FC236}">
+                <a16:creationId xmlns:a16="http://schemas.microsoft.com/office/drawing/2014/main" id="{759F968F-DB29-43C8-9E0F-2307CECD4052}"/>
+              </a:ext>
+            </a:extLst>
+          </p:cNvPr>
+          <p:cNvPicPr>
+            <a:picLocks noChangeAspect="1"/>
+          </p:cNvPicPr>
+          <p:nvPr/>
+        </p:nvPicPr>
+        <p:blipFill>
+          <a:blip r:embed="rId3"/>
+          <a:stretch>
+            <a:fillRect/>
+          </a:stretch>
+        </p:blipFill>
+        <p:spPr>
+          <a:xfrm>
+            <a:off x="285341" y="2777042"/>
+            <a:ext cx="5077526" cy="3162510"/>
+          </a:xfrm>
+          <a:prstGeom prst="rect">
+            <a:avLst/>
+          </a:prstGeom>
+        </p:spPr>
+      </p:pic>
+      <p:sp>
+        <p:nvSpPr>
+          <p:cNvPr id="12" name="TextBox 11">
+            <a:extLst>
+              <a:ext uri="{FF2B5EF4-FFF2-40B4-BE49-F238E27FC236}">
+                <a16:creationId xmlns:a16="http://schemas.microsoft.com/office/drawing/2014/main" id="{F37C6B84-8399-495E-809F-DFEDACEBD2E9}"/>
+              </a:ext>
+            </a:extLst>
+          </p:cNvPr>
+          <p:cNvSpPr txBox="1"/>
+          <p:nvPr/>
+        </p:nvSpPr>
+        <p:spPr>
+          <a:xfrm>
+            <a:off x="481426" y="1510493"/>
+            <a:ext cx="3680333" cy="338554"/>
+          </a:xfrm>
+          <a:prstGeom prst="rect">
+            <a:avLst/>
+          </a:prstGeom>
+          <a:noFill/>
+        </p:spPr>
+        <p:txBody>
+          <a:bodyPr wrap="square" rtlCol="0">
+            <a:spAutoFit/>
+          </a:bodyPr>
+          <a:lstStyle/>
+          <a:p>
+            <a:pPr marL="457200" indent="-457200">
+              <a:buFont typeface="Arial" panose="020B0604020202020204" pitchFamily="34" charset="0"/>
+              <a:buChar char="•"/>
+            </a:pPr>
+            <a:r>
+              <a:rPr lang="en-US" sz="1600" dirty="0"/>
+              <a:t>Supervised – or – unsupervised</a:t>
+            </a:r>
+          </a:p>
+        </p:txBody>
+      </p:sp>
+      <p:sp>
+        <p:nvSpPr>
+          <p:cNvPr id="14" name="TextBox 13">
+            <a:extLst>
+              <a:ext uri="{FF2B5EF4-FFF2-40B4-BE49-F238E27FC236}">
+                <a16:creationId xmlns:a16="http://schemas.microsoft.com/office/drawing/2014/main" id="{E84B0901-85C0-4301-8637-E9DACCBABF47}"/>
+              </a:ext>
+            </a:extLst>
+          </p:cNvPr>
+          <p:cNvSpPr txBox="1"/>
+          <p:nvPr/>
+        </p:nvSpPr>
+        <p:spPr>
+          <a:xfrm>
+            <a:off x="5362867" y="3377096"/>
+            <a:ext cx="3680333" cy="2677656"/>
+          </a:xfrm>
+          <a:prstGeom prst="rect">
+            <a:avLst/>
+          </a:prstGeom>
+          <a:noFill/>
+        </p:spPr>
+        <p:txBody>
+          <a:bodyPr wrap="square" rtlCol="0">
+            <a:spAutoFit/>
+          </a:bodyPr>
+          <a:lstStyle/>
+          <a:p>
+            <a:pPr marL="457200" indent="-457200">
+              <a:buFont typeface="+mj-lt"/>
+              <a:buAutoNum type="arabicPeriod"/>
+            </a:pPr>
+            <a:r>
+              <a:rPr lang="en-US" sz="1800" dirty="0"/>
+              <a:t>Sample a </a:t>
+            </a:r>
+            <a:r>
+              <a:rPr lang="en-US" sz="1800" dirty="0" err="1"/>
+              <a:t>neighbourhood</a:t>
+            </a:r>
+            <a:r>
+              <a:rPr lang="en-US" sz="1800" dirty="0"/>
+              <a:t> for each node</a:t>
+            </a:r>
+          </a:p>
+          <a:p>
+            <a:pPr marL="914400" lvl="1" indent="-457200">
+              <a:buFont typeface="Arial" panose="020B0604020202020204" pitchFamily="34" charset="0"/>
+              <a:buChar char="•"/>
+            </a:pPr>
+            <a:r>
+              <a:rPr lang="en-US" sz="1600" dirty="0"/>
+              <a:t>The sampling strategy can be flexible</a:t>
+            </a:r>
+          </a:p>
+          <a:p>
+            <a:pPr marL="457200" indent="-457200">
+              <a:buFont typeface="+mj-lt"/>
+              <a:buAutoNum type="arabicPeriod"/>
+            </a:pPr>
+            <a:r>
+              <a:rPr lang="en-US" sz="1800" dirty="0"/>
+              <a:t>Learn aggregation weight matrices</a:t>
+            </a:r>
+          </a:p>
+          <a:p>
+            <a:pPr marL="914400" lvl="1" indent="-457200">
+              <a:buFont typeface="Arial" panose="020B0604020202020204" pitchFamily="34" charset="0"/>
+              <a:buChar char="•"/>
+            </a:pPr>
+            <a:r>
+              <a:rPr lang="en-US" sz="1600" dirty="0"/>
+              <a:t>Aggregators can be simple (mean) or more complex</a:t>
+            </a:r>
+          </a:p>
+          <a:p>
+            <a:pPr marL="914400" lvl="1" indent="-457200">
+              <a:buFont typeface="Arial" panose="020B0604020202020204" pitchFamily="34" charset="0"/>
+              <a:buChar char="•"/>
+            </a:pPr>
+            <a:r>
+              <a:rPr lang="en-US" sz="1600" dirty="0"/>
+              <a:t>LSTMs performed really well, but we don’t know why</a:t>
+            </a:r>
           </a:p>
         </p:txBody>
       </p:sp>
@@ -6663,7 +5998,7 @@
 </p:sld>
 </file>
 
-<file path=ppt/slides/slide5.xml><?xml version="1.0" encoding="utf-8"?>
+<file path=ppt/slides/slide6.xml><?xml version="1.0" encoding="utf-8"?>
 <p:sld xmlns:a="http://schemas.openxmlformats.org/drawingml/2006/main" xmlns:r="http://schemas.openxmlformats.org/officeDocument/2006/relationships" xmlns:p="http://schemas.openxmlformats.org/presentationml/2006/main">
   <p:cSld>
     <p:spTree>
@@ -6697,7 +6032,7 @@
           <a:p>
             <a:r>
               <a:rPr lang="en-GB" dirty="0"/>
-              <a:t>WP4 – What have we learned? </a:t>
+              <a:t>WP4 – Next important steps </a:t>
             </a:r>
           </a:p>
         </p:txBody>
@@ -6712,56 +6047,264 @@
             <p:ph sz="quarter" idx="1"/>
           </p:nvPr>
         </p:nvSpPr>
-        <p:spPr/>
+        <p:spPr>
+          <a:xfrm>
+            <a:off x="481427" y="1108800"/>
+            <a:ext cx="7748173" cy="4824000"/>
+          </a:xfrm>
+        </p:spPr>
         <p:txBody>
           <a:bodyPr/>
           <a:lstStyle/>
           <a:p>
-            <a:pPr marL="0" lvl="0" indent="0">
-              <a:buNone/>
-            </a:pPr>
-            <a:r>
-              <a:rPr lang="en-GB" b="1" dirty="0"/>
-              <a:t>Please list and explain your findings (and add examples) within the last month. </a:t>
-            </a:r>
-          </a:p>
-          <a:p>
-            <a:pPr marL="0" lvl="0" indent="0">
-              <a:buNone/>
-            </a:pPr>
-            <a:endParaRPr lang="en-GB" dirty="0"/>
-          </a:p>
-          <a:p>
-            <a:r>
-              <a:rPr lang="en-GB" dirty="0"/>
-              <a:t>First item</a:t>
-            </a:r>
-          </a:p>
-          <a:p>
-            <a:r>
-              <a:rPr lang="en-GB" dirty="0"/>
-              <a:t>Second item</a:t>
-            </a:r>
-          </a:p>
-          <a:p>
-            <a:r>
-              <a:rPr lang="en-GB" dirty="0"/>
-              <a:t>Third item</a:t>
+            <a:r>
+              <a:rPr lang="en-GB" b="0" dirty="0">
+                <a:solidFill>
+                  <a:schemeClr val="tx1"/>
+                </a:solidFill>
+                <a:effectLst/>
+                <a:latin typeface="Arial" panose="020B0604020202020204" pitchFamily="34" charset="0"/>
+                <a:cs typeface="Arial" panose="020B0604020202020204" pitchFamily="34" charset="0"/>
+              </a:rPr>
+              <a:t>Medical University Graz has a dataset of 1.3 million patients with diagnosis spanning multiple organs</a:t>
             </a:r>
           </a:p>
           <a:p>
             <a:pPr lvl="1"/>
             <a:r>
-              <a:rPr lang="en-GB" dirty="0"/>
-              <a:t> First sub item</a:t>
+              <a:rPr lang="en-GB" sz="1600" b="0" dirty="0">
+                <a:solidFill>
+                  <a:schemeClr val="tx1"/>
+                </a:solidFill>
+                <a:effectLst/>
+                <a:latin typeface="Arial" panose="020B0604020202020204" pitchFamily="34" charset="0"/>
+                <a:cs typeface="Arial" panose="020B0604020202020204" pitchFamily="34" charset="0"/>
+              </a:rPr>
+              <a:t>the data-set is </a:t>
+            </a:r>
+            <a:r>
+              <a:rPr lang="en-GB" sz="1600" b="0" i="1" dirty="0">
+                <a:solidFill>
+                  <a:schemeClr val="tx1"/>
+                </a:solidFill>
+                <a:effectLst/>
+                <a:latin typeface="Arial" panose="020B0604020202020204" pitchFamily="34" charset="0"/>
+                <a:cs typeface="Arial" panose="020B0604020202020204" pitchFamily="34" charset="0"/>
+              </a:rPr>
+              <a:t>human</a:t>
+            </a:r>
+            <a:r>
+              <a:rPr lang="en-GB" sz="1600" b="0" dirty="0">
+                <a:solidFill>
+                  <a:schemeClr val="tx1"/>
+                </a:solidFill>
+                <a:effectLst/>
+                <a:latin typeface="Arial" panose="020B0604020202020204" pitchFamily="34" charset="0"/>
+                <a:cs typeface="Arial" panose="020B0604020202020204" pitchFamily="34" charset="0"/>
+              </a:rPr>
+              <a:t> generated (also </a:t>
+            </a:r>
+            <a:r>
+              <a:rPr lang="en-GB" sz="1600" b="0" i="1" dirty="0">
+                <a:solidFill>
+                  <a:schemeClr val="tx1"/>
+                </a:solidFill>
+                <a:effectLst/>
+                <a:latin typeface="Arial" panose="020B0604020202020204" pitchFamily="34" charset="0"/>
+                <a:cs typeface="Arial" panose="020B0604020202020204" pitchFamily="34" charset="0"/>
+              </a:rPr>
+              <a:t>doctor</a:t>
+            </a:r>
+            <a:r>
+              <a:rPr lang="en-GB" sz="1600" b="0" dirty="0">
+                <a:solidFill>
+                  <a:schemeClr val="tx1"/>
+                </a:solidFill>
+                <a:effectLst/>
+                <a:latin typeface="Arial" panose="020B0604020202020204" pitchFamily="34" charset="0"/>
+                <a:cs typeface="Arial" panose="020B0604020202020204" pitchFamily="34" charset="0"/>
+              </a:rPr>
+              <a:t> generated = wordings…)</a:t>
             </a:r>
           </a:p>
           <a:p>
             <a:pPr lvl="1"/>
             <a:r>
-              <a:rPr lang="en-GB" dirty="0"/>
-              <a:t> Second sub item</a:t>
-            </a:r>
+              <a:rPr lang="en-GB" sz="1600" b="0" dirty="0">
+                <a:solidFill>
+                  <a:schemeClr val="tx1"/>
+                </a:solidFill>
+                <a:effectLst/>
+                <a:latin typeface="Arial" panose="020B0604020202020204" pitchFamily="34" charset="0"/>
+                <a:cs typeface="Arial" panose="020B0604020202020204" pitchFamily="34" charset="0"/>
+              </a:rPr>
+              <a:t>a decision tree has been constructed </a:t>
+            </a:r>
+            <a:r>
+              <a:rPr lang="en-GB" sz="1600" b="1" i="1" dirty="0">
+                <a:solidFill>
+                  <a:schemeClr val="tx1"/>
+                </a:solidFill>
+                <a:effectLst/>
+                <a:latin typeface="Arial" panose="020B0604020202020204" pitchFamily="34" charset="0"/>
+                <a:cs typeface="Arial" panose="020B0604020202020204" pitchFamily="34" charset="0"/>
+              </a:rPr>
+              <a:t>manually </a:t>
+            </a:r>
+            <a:r>
+              <a:rPr lang="en-GB" sz="1600" b="0" dirty="0">
+                <a:solidFill>
+                  <a:schemeClr val="tx1"/>
+                </a:solidFill>
+                <a:effectLst/>
+                <a:latin typeface="Arial" panose="020B0604020202020204" pitchFamily="34" charset="0"/>
+                <a:cs typeface="Arial" panose="020B0604020202020204" pitchFamily="34" charset="0"/>
+              </a:rPr>
+              <a:t>(= ground truth / ~120 rules)</a:t>
+            </a:r>
+          </a:p>
+          <a:p>
+            <a:r>
+              <a:rPr lang="en-GB" dirty="0">
+                <a:solidFill>
+                  <a:schemeClr val="tx1"/>
+                </a:solidFill>
+                <a:latin typeface="Arial" panose="020B0604020202020204" pitchFamily="34" charset="0"/>
+                <a:cs typeface="Arial" panose="020B0604020202020204" pitchFamily="34" charset="0"/>
+              </a:rPr>
+              <a:t>I</a:t>
+            </a:r>
+            <a:r>
+              <a:rPr lang="en-GB" b="0" dirty="0">
+                <a:solidFill>
+                  <a:schemeClr val="tx1"/>
+                </a:solidFill>
+                <a:effectLst/>
+                <a:latin typeface="Arial" panose="020B0604020202020204" pitchFamily="34" charset="0"/>
+                <a:cs typeface="Arial" panose="020B0604020202020204" pitchFamily="34" charset="0"/>
+              </a:rPr>
+              <a:t>nteresting questions include</a:t>
+            </a:r>
+          </a:p>
+          <a:p>
+            <a:pPr lvl="1"/>
+            <a:r>
+              <a:rPr lang="en-GB" sz="1600" dirty="0">
+                <a:solidFill>
+                  <a:schemeClr val="tx1"/>
+                </a:solidFill>
+                <a:latin typeface="Arial" panose="020B0604020202020204" pitchFamily="34" charset="0"/>
+                <a:cs typeface="Arial" panose="020B0604020202020204" pitchFamily="34" charset="0"/>
+              </a:rPr>
+              <a:t>h</a:t>
+            </a:r>
+            <a:r>
+              <a:rPr lang="en-GB" sz="1600" b="0" dirty="0">
+                <a:solidFill>
+                  <a:schemeClr val="tx1"/>
+                </a:solidFill>
+                <a:effectLst/>
+                <a:latin typeface="Arial" panose="020B0604020202020204" pitchFamily="34" charset="0"/>
+                <a:cs typeface="Arial" panose="020B0604020202020204" pitchFamily="34" charset="0"/>
+              </a:rPr>
+              <a:t>ow to learn embeddings / node representations directly on that corpus?</a:t>
+            </a:r>
+          </a:p>
+          <a:p>
+            <a:pPr lvl="1"/>
+            <a:r>
+              <a:rPr lang="en-GB" sz="1600" b="0" dirty="0">
+                <a:solidFill>
+                  <a:schemeClr val="tx1"/>
+                </a:solidFill>
+                <a:effectLst/>
+                <a:latin typeface="Arial" panose="020B0604020202020204" pitchFamily="34" charset="0"/>
+                <a:cs typeface="Arial" panose="020B0604020202020204" pitchFamily="34" charset="0"/>
+              </a:rPr>
+              <a:t>how do the embeddings / reps change if we learn on a graph initialized according to human bias (edges between patients in same age cohorts etc...)</a:t>
+            </a:r>
+          </a:p>
+          <a:p>
+            <a:pPr lvl="1"/>
+            <a:r>
+              <a:rPr lang="en-GB" sz="1600" dirty="0">
+                <a:solidFill>
+                  <a:schemeClr val="tx1"/>
+                </a:solidFill>
+                <a:latin typeface="Arial" panose="020B0604020202020204" pitchFamily="34" charset="0"/>
+                <a:cs typeface="Arial" panose="020B0604020202020204" pitchFamily="34" charset="0"/>
+              </a:rPr>
+              <a:t>m</a:t>
+            </a:r>
+            <a:r>
+              <a:rPr lang="en-GB" sz="1600" b="0" dirty="0">
+                <a:solidFill>
+                  <a:schemeClr val="tx1"/>
+                </a:solidFill>
+                <a:effectLst/>
+                <a:latin typeface="Arial" panose="020B0604020202020204" pitchFamily="34" charset="0"/>
+                <a:cs typeface="Arial" panose="020B0604020202020204" pitchFamily="34" charset="0"/>
+              </a:rPr>
+              <a:t>atching nodes representing same diagnoses that are expressed in different wording? (“Fusion”)</a:t>
+            </a:r>
+          </a:p>
+          <a:p>
+            <a:r>
+              <a:rPr lang="en-GB" dirty="0">
+                <a:solidFill>
+                  <a:schemeClr val="tx1"/>
+                </a:solidFill>
+                <a:latin typeface="Arial" panose="020B0604020202020204" pitchFamily="34" charset="0"/>
+                <a:cs typeface="Arial" panose="020B0604020202020204" pitchFamily="34" charset="0"/>
+              </a:rPr>
+              <a:t>B</a:t>
+            </a:r>
+            <a:r>
+              <a:rPr lang="en-GB" b="0" dirty="0">
+                <a:solidFill>
+                  <a:schemeClr val="tx1"/>
+                </a:solidFill>
+                <a:effectLst/>
+                <a:latin typeface="Arial" panose="020B0604020202020204" pitchFamily="34" charset="0"/>
+                <a:cs typeface="Arial" panose="020B0604020202020204" pitchFamily="34" charset="0"/>
+              </a:rPr>
+              <a:t>uilding a controlled (graph) "vocabulary" for interesting regions in images (cell clusters) and their relations</a:t>
+            </a:r>
+          </a:p>
+          <a:p>
+            <a:pPr lvl="1"/>
+            <a:r>
+              <a:rPr lang="en-GB" sz="1600" b="0" dirty="0">
+                <a:solidFill>
+                  <a:schemeClr val="tx1"/>
+                </a:solidFill>
+                <a:effectLst/>
+                <a:latin typeface="Arial" panose="020B0604020202020204" pitchFamily="34" charset="0"/>
+                <a:cs typeface="Arial" panose="020B0604020202020204" pitchFamily="34" charset="0"/>
+              </a:rPr>
+              <a:t>e.g. shape descriptions of lymph nodes.. (this is going to be a Masters thesis)</a:t>
+            </a:r>
+          </a:p>
+          <a:p>
+            <a:pPr lvl="1"/>
+            <a:r>
+              <a:rPr lang="en-GB" sz="1600" b="0" dirty="0">
+                <a:solidFill>
+                  <a:schemeClr val="tx1"/>
+                </a:solidFill>
+                <a:effectLst/>
+                <a:latin typeface="Arial" panose="020B0604020202020204" pitchFamily="34" charset="0"/>
+                <a:cs typeface="Arial" panose="020B0604020202020204" pitchFamily="34" charset="0"/>
+              </a:rPr>
+              <a:t>we could later use this to extract graphs out of images</a:t>
+            </a:r>
+            <a:endParaRPr lang="en-GB" sz="1600" dirty="0">
+              <a:solidFill>
+                <a:schemeClr val="tx1"/>
+              </a:solidFill>
+              <a:latin typeface="Arial" panose="020B0604020202020204" pitchFamily="34" charset="0"/>
+              <a:cs typeface="Arial" panose="020B0604020202020204" pitchFamily="34" charset="0"/>
+            </a:endParaRPr>
           </a:p>
         </p:txBody>
       </p:sp>
@@ -6793,127 +6336,7 @@
     </p:spTree>
     <p:extLst>
       <p:ext uri="{BB962C8B-B14F-4D97-AF65-F5344CB8AC3E}">
-        <p14:creationId xmlns:p14="http://schemas.microsoft.com/office/powerpoint/2010/main" val="1755911748"/>
-      </p:ext>
-    </p:extLst>
-  </p:cSld>
-  <p:clrMapOvr>
-    <a:masterClrMapping/>
-  </p:clrMapOvr>
-</p:sld>
-</file>
-
-<file path=ppt/slides/slide6.xml><?xml version="1.0" encoding="utf-8"?>
-<p:sld xmlns:a="http://schemas.openxmlformats.org/drawingml/2006/main" xmlns:r="http://schemas.openxmlformats.org/officeDocument/2006/relationships" xmlns:p="http://schemas.openxmlformats.org/presentationml/2006/main">
-  <p:cSld>
-    <p:spTree>
-      <p:nvGrpSpPr>
-        <p:cNvPr id="1" name=""/>
-        <p:cNvGrpSpPr/>
-        <p:nvPr/>
-      </p:nvGrpSpPr>
-      <p:grpSpPr>
-        <a:xfrm>
-          <a:off x="0" y="0"/>
-          <a:ext cx="0" cy="0"/>
-          <a:chOff x="0" y="0"/>
-          <a:chExt cx="0" cy="0"/>
-        </a:xfrm>
-      </p:grpSpPr>
-      <p:sp>
-        <p:nvSpPr>
-          <p:cNvPr id="2" name="Title 1">
-            <a:extLst>
-              <a:ext uri="{FF2B5EF4-FFF2-40B4-BE49-F238E27FC236}">
-                <a16:creationId xmlns:a16="http://schemas.microsoft.com/office/drawing/2014/main" id="{C1FDB87A-3338-40AF-B490-6445F74B78FC}"/>
-              </a:ext>
-            </a:extLst>
-          </p:cNvPr>
-          <p:cNvSpPr>
-            <a:spLocks noGrp="1"/>
-          </p:cNvSpPr>
-          <p:nvPr>
-            <p:ph type="title"/>
-          </p:nvPr>
-        </p:nvSpPr>
-        <p:spPr/>
-        <p:txBody>
-          <a:bodyPr/>
-          <a:lstStyle/>
-          <a:p>
-            <a:endParaRPr lang="en-US"/>
-          </a:p>
-        </p:txBody>
-      </p:sp>
-      <p:sp>
-        <p:nvSpPr>
-          <p:cNvPr id="4" name="Footer Placeholder 3">
-            <a:extLst>
-              <a:ext uri="{FF2B5EF4-FFF2-40B4-BE49-F238E27FC236}">
-                <a16:creationId xmlns:a16="http://schemas.microsoft.com/office/drawing/2014/main" id="{C3694155-B703-491F-B4DE-366560C066CF}"/>
-              </a:ext>
-            </a:extLst>
-          </p:cNvPr>
-          <p:cNvSpPr>
-            <a:spLocks noGrp="1"/>
-          </p:cNvSpPr>
-          <p:nvPr>
-            <p:ph type="ftr" sz="quarter" idx="3"/>
-          </p:nvPr>
-        </p:nvSpPr>
-        <p:spPr/>
-        <p:txBody>
-          <a:bodyPr/>
-          <a:lstStyle/>
-          <a:p>
-            <a:pPr>
-              <a:defRPr/>
-            </a:pPr>
-            <a:r>
-              <a:rPr lang="de-DE"/>
-              <a:t>This project hast received funding from the European Union’s Horizon 2020 research and innovation programme under grant agreement No </a:t>
-            </a:r>
-            <a:r>
-              <a:rPr lang="is-IS"/>
-              <a:t>826078</a:t>
-            </a:r>
-            <a:endParaRPr lang="de-DE" dirty="0"/>
-          </a:p>
-        </p:txBody>
-      </p:sp>
-      <p:pic>
-        <p:nvPicPr>
-          <p:cNvPr id="5" name="Content Placeholder 5" descr="A close up of a map&#10;&#10;Description automatically generated">
-            <a:extLst>
-              <a:ext uri="{FF2B5EF4-FFF2-40B4-BE49-F238E27FC236}">
-                <a16:creationId xmlns:a16="http://schemas.microsoft.com/office/drawing/2014/main" id="{013E739F-9F30-4F05-8BF4-A1B20223C535}"/>
-              </a:ext>
-            </a:extLst>
-          </p:cNvPr>
-          <p:cNvPicPr>
-            <a:picLocks noGrp="1" noChangeAspect="1"/>
-          </p:cNvPicPr>
-          <p:nvPr>
-            <p:ph sz="quarter" idx="1"/>
-          </p:nvPr>
-        </p:nvPicPr>
-        <p:blipFill>
-          <a:blip r:embed="rId2"/>
-          <a:stretch>
-            <a:fillRect/>
-          </a:stretch>
-        </p:blipFill>
-        <p:spPr>
-          <a:xfrm>
-            <a:off x="481426" y="1564406"/>
-            <a:ext cx="3844032" cy="1638725"/>
-          </a:xfrm>
-        </p:spPr>
-      </p:pic>
-    </p:spTree>
-    <p:extLst>
-      <p:ext uri="{BB962C8B-B14F-4D97-AF65-F5344CB8AC3E}">
-        <p14:creationId xmlns:p14="http://schemas.microsoft.com/office/powerpoint/2010/main" val="4039423577"/>
+        <p14:creationId xmlns:p14="http://schemas.microsoft.com/office/powerpoint/2010/main" val="3638036196"/>
       </p:ext>
     </p:extLst>
   </p:cSld>
@@ -6924,146 +6347,6 @@
 </file>
 
 <file path=ppt/slides/slide7.xml><?xml version="1.0" encoding="utf-8"?>
-<p:sld xmlns:a="http://schemas.openxmlformats.org/drawingml/2006/main" xmlns:r="http://schemas.openxmlformats.org/officeDocument/2006/relationships" xmlns:p="http://schemas.openxmlformats.org/presentationml/2006/main">
-  <p:cSld>
-    <p:spTree>
-      <p:nvGrpSpPr>
-        <p:cNvPr id="1" name=""/>
-        <p:cNvGrpSpPr/>
-        <p:nvPr/>
-      </p:nvGrpSpPr>
-      <p:grpSpPr>
-        <a:xfrm>
-          <a:off x="0" y="0"/>
-          <a:ext cx="0" cy="0"/>
-          <a:chOff x="0" y="0"/>
-          <a:chExt cx="0" cy="0"/>
-        </a:xfrm>
-      </p:grpSpPr>
-      <p:sp>
-        <p:nvSpPr>
-          <p:cNvPr id="2" name="Titel 1"/>
-          <p:cNvSpPr>
-            <a:spLocks noGrp="1"/>
-          </p:cNvSpPr>
-          <p:nvPr>
-            <p:ph type="title"/>
-          </p:nvPr>
-        </p:nvSpPr>
-        <p:spPr/>
-        <p:txBody>
-          <a:bodyPr/>
-          <a:lstStyle/>
-          <a:p>
-            <a:r>
-              <a:rPr lang="en-GB" dirty="0"/>
-              <a:t>WP4 – Next important steps </a:t>
-            </a:r>
-          </a:p>
-        </p:txBody>
-      </p:sp>
-      <p:sp>
-        <p:nvSpPr>
-          <p:cNvPr id="3" name="Inhaltsplatzhalter 2"/>
-          <p:cNvSpPr>
-            <a:spLocks noGrp="1"/>
-          </p:cNvSpPr>
-          <p:nvPr>
-            <p:ph sz="quarter" idx="1"/>
-          </p:nvPr>
-        </p:nvSpPr>
-        <p:spPr/>
-        <p:txBody>
-          <a:bodyPr/>
-          <a:lstStyle/>
-          <a:p>
-            <a:pPr marL="0" lvl="0" indent="0">
-              <a:buNone/>
-            </a:pPr>
-            <a:r>
-              <a:rPr lang="en-GB" b="1" dirty="0"/>
-              <a:t>Please briefly provide an outlook of the important steps for the next 6 months. </a:t>
-            </a:r>
-          </a:p>
-          <a:p>
-            <a:pPr marL="0" lvl="0" indent="0">
-              <a:buNone/>
-            </a:pPr>
-            <a:endParaRPr lang="en-GB" dirty="0"/>
-          </a:p>
-          <a:p>
-            <a:r>
-              <a:rPr lang="en-GB" dirty="0"/>
-              <a:t>First item</a:t>
-            </a:r>
-          </a:p>
-          <a:p>
-            <a:r>
-              <a:rPr lang="en-GB" dirty="0"/>
-              <a:t>Second item</a:t>
-            </a:r>
-          </a:p>
-          <a:p>
-            <a:r>
-              <a:rPr lang="en-GB" dirty="0"/>
-              <a:t>Third item</a:t>
-            </a:r>
-          </a:p>
-          <a:p>
-            <a:pPr lvl="1"/>
-            <a:r>
-              <a:rPr lang="en-GB" dirty="0"/>
-              <a:t> First sub item</a:t>
-            </a:r>
-          </a:p>
-          <a:p>
-            <a:pPr lvl="1"/>
-            <a:r>
-              <a:rPr lang="en-GB" dirty="0"/>
-              <a:t> Second sub item</a:t>
-            </a:r>
-          </a:p>
-        </p:txBody>
-      </p:sp>
-      <p:sp>
-        <p:nvSpPr>
-          <p:cNvPr id="4" name="Fußzeilenplatzhalter 3"/>
-          <p:cNvSpPr>
-            <a:spLocks noGrp="1"/>
-          </p:cNvSpPr>
-          <p:nvPr>
-            <p:ph type="ftr" sz="quarter" idx="3"/>
-          </p:nvPr>
-        </p:nvSpPr>
-        <p:spPr/>
-        <p:txBody>
-          <a:bodyPr/>
-          <a:lstStyle/>
-          <a:p>
-            <a:pPr>
-              <a:defRPr/>
-            </a:pPr>
-            <a:r>
-              <a:rPr lang="en-GB" dirty="0"/>
-              <a:t>This project has received funding from the European Union’s Horizon 2020 research and innovation programme under grant agreement No 826078</a:t>
-            </a:r>
-          </a:p>
-        </p:txBody>
-      </p:sp>
-    </p:spTree>
-    <p:extLst>
-      <p:ext uri="{BB962C8B-B14F-4D97-AF65-F5344CB8AC3E}">
-        <p14:creationId xmlns:p14="http://schemas.microsoft.com/office/powerpoint/2010/main" val="3638036196"/>
-      </p:ext>
-    </p:extLst>
-  </p:cSld>
-  <p:clrMapOvr>
-    <a:masterClrMapping/>
-  </p:clrMapOvr>
-</p:sld>
-</file>
-
-<file path=ppt/slides/slide8.xml><?xml version="1.0" encoding="utf-8"?>
 <p:sld xmlns:a="http://schemas.openxmlformats.org/drawingml/2006/main" xmlns:r="http://schemas.openxmlformats.org/officeDocument/2006/relationships" xmlns:p="http://schemas.openxmlformats.org/presentationml/2006/main">
   <p:cSld>
     <p:spTree>
@@ -7103,7 +6386,7 @@
           <a:p>
             <a:r>
               <a:rPr lang="en-US" dirty="0"/>
-              <a:t>WP4 – Grand vision</a:t>
+              <a:t>WP4 – Next important steps – Grand vision</a:t>
             </a:r>
           </a:p>
         </p:txBody>
@@ -7132,8 +6415,8 @@
         </p:blipFill>
         <p:spPr>
           <a:xfrm>
-            <a:off x="481426" y="1499110"/>
-            <a:ext cx="5973221" cy="4140200"/>
+            <a:off x="445426" y="1116000"/>
+            <a:ext cx="7159275" cy="4838399"/>
           </a:xfrm>
         </p:spPr>
       </p:pic>
@@ -7186,7 +6469,7 @@
 </p:sld>
 </file>
 
-<file path=ppt/slides/slide9.xml><?xml version="1.0" encoding="utf-8"?>
+<file path=ppt/slides/slide8.xml><?xml version="1.0" encoding="utf-8"?>
 <p:sld xmlns:a="http://schemas.openxmlformats.org/drawingml/2006/main" xmlns:r="http://schemas.openxmlformats.org/officeDocument/2006/relationships" xmlns:p="http://schemas.openxmlformats.org/presentationml/2006/main">
   <p:cSld>
     <p:spTree>
@@ -7235,7 +6518,12 @@
             <p:ph sz="quarter" idx="1"/>
           </p:nvPr>
         </p:nvSpPr>
-        <p:spPr/>
+        <p:spPr>
+          <a:xfrm>
+            <a:off x="481427" y="1159200"/>
+            <a:ext cx="7697774" cy="4701600"/>
+          </a:xfrm>
+        </p:spPr>
         <p:txBody>
           <a:bodyPr/>
           <a:lstStyle/>
@@ -7257,33 +6545,52 @@
           <a:p>
             <a:r>
               <a:rPr lang="en-GB" dirty="0"/>
-              <a:t>First item</a:t>
-            </a:r>
+              <a:t>Feasibility of multi-modal graph / embeddings construction</a:t>
+            </a:r>
+          </a:p>
+          <a:p>
+            <a:pPr lvl="1"/>
+            <a:r>
+              <a:rPr lang="en-GB" sz="1600" dirty="0"/>
+              <a:t>Graph cell extraction from images already works, but they don’t include other modalities</a:t>
+            </a:r>
+          </a:p>
+          <a:p>
+            <a:pPr lvl="1"/>
+            <a:r>
+              <a:rPr lang="en-GB" sz="1600" dirty="0"/>
+              <a:t>How to align embeddings across different modalities</a:t>
+            </a:r>
+          </a:p>
+          <a:p>
+            <a:pPr lvl="1"/>
+            <a:endParaRPr lang="en-GB" sz="1600" dirty="0"/>
           </a:p>
           <a:p>
             <a:r>
               <a:rPr lang="en-GB" dirty="0"/>
-              <a:t>Second item</a:t>
-            </a:r>
-          </a:p>
-          <a:p>
-            <a:r>
-              <a:rPr lang="en-GB" dirty="0"/>
-              <a:t>Third item</a:t>
+              <a:t>How to sample neighborhoods across the network? -&gt; DON’T ??</a:t>
             </a:r>
           </a:p>
           <a:p>
             <a:pPr lvl="1"/>
             <a:r>
-              <a:rPr lang="en-GB" dirty="0"/>
-              <a:t> First sub item</a:t>
+              <a:rPr lang="en-GB" sz="1600" dirty="0"/>
+              <a:t>can we replace raw data with anonymized feature vectors?</a:t>
             </a:r>
           </a:p>
           <a:p>
             <a:pPr lvl="1"/>
             <a:r>
-              <a:rPr lang="en-GB" dirty="0"/>
-              <a:t> Second sub item</a:t>
+              <a:rPr lang="en-GB" sz="1600" dirty="0"/>
+              <a:t>or just use aggregated vectors from other subgraphs (nodes represent whole subgraphs)</a:t>
+            </a:r>
+          </a:p>
+          <a:p>
+            <a:pPr lvl="1"/>
+            <a:r>
+              <a:rPr lang="en-GB" sz="1600" dirty="0"/>
+              <a:t>How to learn a collaboration graph? (task / objective function similarity measure)</a:t>
             </a:r>
           </a:p>
         </p:txBody>
@@ -7317,6 +6624,110 @@
     <p:extLst>
       <p:ext uri="{BB962C8B-B14F-4D97-AF65-F5344CB8AC3E}">
         <p14:creationId xmlns:p14="http://schemas.microsoft.com/office/powerpoint/2010/main" val="849220050"/>
+      </p:ext>
+    </p:extLst>
+  </p:cSld>
+  <p:clrMapOvr>
+    <a:masterClrMapping/>
+  </p:clrMapOvr>
+</p:sld>
+</file>
+
+<file path=ppt/slides/slide9.xml><?xml version="1.0" encoding="utf-8"?>
+<p:sld xmlns:a="http://schemas.openxmlformats.org/drawingml/2006/main" xmlns:r="http://schemas.openxmlformats.org/officeDocument/2006/relationships" xmlns:p="http://schemas.openxmlformats.org/presentationml/2006/main">
+  <p:cSld>
+    <p:spTree>
+      <p:nvGrpSpPr>
+        <p:cNvPr id="1" name=""/>
+        <p:cNvGrpSpPr/>
+        <p:nvPr/>
+      </p:nvGrpSpPr>
+      <p:grpSpPr>
+        <a:xfrm>
+          <a:off x="0" y="0"/>
+          <a:ext cx="0" cy="0"/>
+          <a:chOff x="0" y="0"/>
+          <a:chExt cx="0" cy="0"/>
+        </a:xfrm>
+      </p:grpSpPr>
+      <p:sp>
+        <p:nvSpPr>
+          <p:cNvPr id="4" name="Fußzeilenplatzhalter 3"/>
+          <p:cNvSpPr>
+            <a:spLocks noGrp="1"/>
+          </p:cNvSpPr>
+          <p:nvPr>
+            <p:ph type="ftr" sz="quarter" idx="3"/>
+          </p:nvPr>
+        </p:nvSpPr>
+        <p:spPr/>
+        <p:txBody>
+          <a:bodyPr/>
+          <a:lstStyle/>
+          <a:p>
+            <a:pPr>
+              <a:defRPr/>
+            </a:pPr>
+            <a:r>
+              <a:rPr lang="en-GB" dirty="0"/>
+              <a:t>This project has received funding from the European Union’s Horizon 2020 research and innovation programme under grant agreement No 826078</a:t>
+            </a:r>
+          </a:p>
+        </p:txBody>
+      </p:sp>
+      <p:sp>
+        <p:nvSpPr>
+          <p:cNvPr id="7" name="Text Box 4"/>
+          <p:cNvSpPr txBox="1">
+            <a:spLocks noChangeArrowheads="1"/>
+          </p:cNvSpPr>
+          <p:nvPr/>
+        </p:nvSpPr>
+        <p:spPr bwMode="auto">
+          <a:xfrm rot="956087">
+            <a:off x="2468148" y="2548992"/>
+            <a:ext cx="4032250" cy="923330"/>
+          </a:xfrm>
+          <a:prstGeom prst="rect">
+            <a:avLst/>
+          </a:prstGeom>
+          <a:solidFill>
+            <a:srgbClr val="C8D200"/>
+          </a:solidFill>
+          <a:ln w="28575">
+            <a:solidFill>
+              <a:srgbClr val="153A8C"/>
+            </a:solidFill>
+            <a:miter lim="800000"/>
+            <a:headEnd/>
+            <a:tailEnd/>
+          </a:ln>
+        </p:spPr>
+        <p:txBody>
+          <a:bodyPr>
+            <a:spAutoFit/>
+          </a:bodyPr>
+          <a:lstStyle/>
+          <a:p>
+            <a:pPr algn="ctr"/>
+            <a:r>
+              <a:rPr lang="en-US" sz="1800" b="1" dirty="0"/>
+              <a:t>Please mind the time for your presentation - see agenda. </a:t>
+            </a:r>
+          </a:p>
+          <a:p>
+            <a:pPr algn="ctr"/>
+            <a:r>
+              <a:rPr lang="en-US" sz="1800" b="1" dirty="0"/>
+              <a:t>Thank you.</a:t>
+            </a:r>
+          </a:p>
+        </p:txBody>
+      </p:sp>
+    </p:spTree>
+    <p:extLst>
+      <p:ext uri="{BB962C8B-B14F-4D97-AF65-F5344CB8AC3E}">
+        <p14:creationId xmlns:p14="http://schemas.microsoft.com/office/powerpoint/2010/main" val="3062425111"/>
       </p:ext>
     </p:extLst>
   </p:cSld>

</xml_diff>